<commit_message>
most chapters are edited
</commit_message>
<xml_diff>
--- a/NewThesis/LaTex-template-package/Drawing4/FinalCorr.pptx
+++ b/NewThesis/LaTex-template-package/Drawing4/FinalCorr.pptx
@@ -2,19 +2,19 @@
 <file path=ppt/presentation.xml><?xml version="1.0" encoding="utf-8"?>
 <p:presentation xmlns:a="http://schemas.openxmlformats.org/drawingml/2006/main" xmlns:r="http://schemas.openxmlformats.org/officeDocument/2006/relationships" xmlns:p="http://schemas.openxmlformats.org/presentationml/2006/main" saveSubsetFonts="1">
   <p:sldMasterIdLst>
-    <p:sldMasterId id="2147483816" r:id="rId1"/>
+    <p:sldMasterId id="2147483876" r:id="rId1"/>
   </p:sldMasterIdLst>
   <p:sldIdLst>
     <p:sldId id="257" r:id="rId2"/>
   </p:sldIdLst>
-  <p:sldSz cx="14465300" cy="7199313"/>
+  <p:sldSz cx="20116800" cy="10972800"/>
   <p:notesSz cx="6858000" cy="9144000"/>
   <p:defaultTextStyle>
     <a:defPPr>
       <a:defRPr lang="en-US"/>
     </a:defPPr>
-    <a:lvl1pPr marL="0" algn="l" defTabSz="457200" rtl="0" eaLnBrk="1" latinLnBrk="0" hangingPunct="1">
-      <a:defRPr sz="1800" kern="1200">
+    <a:lvl1pPr marL="0" algn="l" defTabSz="557580" rtl="0" eaLnBrk="1" latinLnBrk="0" hangingPunct="1">
+      <a:defRPr sz="2196" kern="1200">
         <a:solidFill>
           <a:schemeClr val="tx1"/>
         </a:solidFill>
@@ -23,8 +23,8 @@
         <a:cs typeface="+mn-cs"/>
       </a:defRPr>
     </a:lvl1pPr>
-    <a:lvl2pPr marL="457200" algn="l" defTabSz="457200" rtl="0" eaLnBrk="1" latinLnBrk="0" hangingPunct="1">
-      <a:defRPr sz="1800" kern="1200">
+    <a:lvl2pPr marL="557580" algn="l" defTabSz="557580" rtl="0" eaLnBrk="1" latinLnBrk="0" hangingPunct="1">
+      <a:defRPr sz="2196" kern="1200">
         <a:solidFill>
           <a:schemeClr val="tx1"/>
         </a:solidFill>
@@ -33,8 +33,8 @@
         <a:cs typeface="+mn-cs"/>
       </a:defRPr>
     </a:lvl2pPr>
-    <a:lvl3pPr marL="914400" algn="l" defTabSz="457200" rtl="0" eaLnBrk="1" latinLnBrk="0" hangingPunct="1">
-      <a:defRPr sz="1800" kern="1200">
+    <a:lvl3pPr marL="1115159" algn="l" defTabSz="557580" rtl="0" eaLnBrk="1" latinLnBrk="0" hangingPunct="1">
+      <a:defRPr sz="2196" kern="1200">
         <a:solidFill>
           <a:schemeClr val="tx1"/>
         </a:solidFill>
@@ -43,8 +43,8 @@
         <a:cs typeface="+mn-cs"/>
       </a:defRPr>
     </a:lvl3pPr>
-    <a:lvl4pPr marL="1371600" algn="l" defTabSz="457200" rtl="0" eaLnBrk="1" latinLnBrk="0" hangingPunct="1">
-      <a:defRPr sz="1800" kern="1200">
+    <a:lvl4pPr marL="1672740" algn="l" defTabSz="557580" rtl="0" eaLnBrk="1" latinLnBrk="0" hangingPunct="1">
+      <a:defRPr sz="2196" kern="1200">
         <a:solidFill>
           <a:schemeClr val="tx1"/>
         </a:solidFill>
@@ -53,8 +53,8 @@
         <a:cs typeface="+mn-cs"/>
       </a:defRPr>
     </a:lvl4pPr>
-    <a:lvl5pPr marL="1828800" algn="l" defTabSz="457200" rtl="0" eaLnBrk="1" latinLnBrk="0" hangingPunct="1">
-      <a:defRPr sz="1800" kern="1200">
+    <a:lvl5pPr marL="2230319" algn="l" defTabSz="557580" rtl="0" eaLnBrk="1" latinLnBrk="0" hangingPunct="1">
+      <a:defRPr sz="2196" kern="1200">
         <a:solidFill>
           <a:schemeClr val="tx1"/>
         </a:solidFill>
@@ -63,8 +63,8 @@
         <a:cs typeface="+mn-cs"/>
       </a:defRPr>
     </a:lvl5pPr>
-    <a:lvl6pPr marL="2286000" algn="l" defTabSz="457200" rtl="0" eaLnBrk="1" latinLnBrk="0" hangingPunct="1">
-      <a:defRPr sz="1800" kern="1200">
+    <a:lvl6pPr marL="2787900" algn="l" defTabSz="557580" rtl="0" eaLnBrk="1" latinLnBrk="0" hangingPunct="1">
+      <a:defRPr sz="2196" kern="1200">
         <a:solidFill>
           <a:schemeClr val="tx1"/>
         </a:solidFill>
@@ -73,8 +73,8 @@
         <a:cs typeface="+mn-cs"/>
       </a:defRPr>
     </a:lvl6pPr>
-    <a:lvl7pPr marL="2743200" algn="l" defTabSz="457200" rtl="0" eaLnBrk="1" latinLnBrk="0" hangingPunct="1">
-      <a:defRPr sz="1800" kern="1200">
+    <a:lvl7pPr marL="3345479" algn="l" defTabSz="557580" rtl="0" eaLnBrk="1" latinLnBrk="0" hangingPunct="1">
+      <a:defRPr sz="2196" kern="1200">
         <a:solidFill>
           <a:schemeClr val="tx1"/>
         </a:solidFill>
@@ -83,8 +83,8 @@
         <a:cs typeface="+mn-cs"/>
       </a:defRPr>
     </a:lvl7pPr>
-    <a:lvl8pPr marL="3200400" algn="l" defTabSz="457200" rtl="0" eaLnBrk="1" latinLnBrk="0" hangingPunct="1">
-      <a:defRPr sz="1800" kern="1200">
+    <a:lvl8pPr marL="3903061" algn="l" defTabSz="557580" rtl="0" eaLnBrk="1" latinLnBrk="0" hangingPunct="1">
+      <a:defRPr sz="2196" kern="1200">
         <a:solidFill>
           <a:schemeClr val="tx1"/>
         </a:solidFill>
@@ -93,8 +93,8 @@
         <a:cs typeface="+mn-cs"/>
       </a:defRPr>
     </a:lvl8pPr>
-    <a:lvl9pPr marL="3657600" algn="l" defTabSz="457200" rtl="0" eaLnBrk="1" latinLnBrk="0" hangingPunct="1">
-      <a:defRPr sz="1800" kern="1200">
+    <a:lvl9pPr marL="4460640" algn="l" defTabSz="557580" rtl="0" eaLnBrk="1" latinLnBrk="0" hangingPunct="1">
+      <a:defRPr sz="2196" kern="1200">
         <a:solidFill>
           <a:schemeClr val="tx1"/>
         </a:solidFill>
@@ -141,15 +141,15 @@
         </p:nvSpPr>
         <p:spPr>
           <a:xfrm>
-            <a:off x="1808163" y="1178222"/>
-            <a:ext cx="10848975" cy="2506427"/>
+            <a:off x="2514600" y="1795781"/>
+            <a:ext cx="15087600" cy="3820160"/>
           </a:xfrm>
         </p:spPr>
         <p:txBody>
           <a:bodyPr anchor="b"/>
           <a:lstStyle>
             <a:lvl1pPr algn="ctr">
-              <a:defRPr sz="6299"/>
+              <a:defRPr sz="9600"/>
             </a:lvl1pPr>
           </a:lstStyle>
           <a:p>
@@ -173,8 +173,8 @@
         </p:nvSpPr>
         <p:spPr>
           <a:xfrm>
-            <a:off x="1808163" y="3781306"/>
-            <a:ext cx="10848975" cy="1738167"/>
+            <a:off x="2514600" y="5763261"/>
+            <a:ext cx="15087600" cy="2649219"/>
           </a:xfrm>
         </p:spPr>
         <p:txBody>
@@ -182,39 +182,39 @@
           <a:lstStyle>
             <a:lvl1pPr marL="0" indent="0" algn="ctr">
               <a:buNone/>
-              <a:defRPr sz="2520"/>
+              <a:defRPr sz="3840"/>
             </a:lvl1pPr>
-            <a:lvl2pPr marL="479969" indent="0" algn="ctr">
-              <a:buNone/>
-              <a:defRPr sz="2100"/>
+            <a:lvl2pPr marL="731520" indent="0" algn="ctr">
+              <a:buNone/>
+              <a:defRPr sz="3200"/>
             </a:lvl2pPr>
-            <a:lvl3pPr marL="959937" indent="0" algn="ctr">
-              <a:buNone/>
-              <a:defRPr sz="1890"/>
+            <a:lvl3pPr marL="1463040" indent="0" algn="ctr">
+              <a:buNone/>
+              <a:defRPr sz="2880"/>
             </a:lvl3pPr>
-            <a:lvl4pPr marL="1439906" indent="0" algn="ctr">
-              <a:buNone/>
-              <a:defRPr sz="1680"/>
+            <a:lvl4pPr marL="2194560" indent="0" algn="ctr">
+              <a:buNone/>
+              <a:defRPr sz="2560"/>
             </a:lvl4pPr>
-            <a:lvl5pPr marL="1919874" indent="0" algn="ctr">
-              <a:buNone/>
-              <a:defRPr sz="1680"/>
+            <a:lvl5pPr marL="2926080" indent="0" algn="ctr">
+              <a:buNone/>
+              <a:defRPr sz="2560"/>
             </a:lvl5pPr>
-            <a:lvl6pPr marL="2399843" indent="0" algn="ctr">
-              <a:buNone/>
-              <a:defRPr sz="1680"/>
+            <a:lvl6pPr marL="3657600" indent="0" algn="ctr">
+              <a:buNone/>
+              <a:defRPr sz="2560"/>
             </a:lvl6pPr>
-            <a:lvl7pPr marL="2879811" indent="0" algn="ctr">
-              <a:buNone/>
-              <a:defRPr sz="1680"/>
+            <a:lvl7pPr marL="4389120" indent="0" algn="ctr">
+              <a:buNone/>
+              <a:defRPr sz="2560"/>
             </a:lvl7pPr>
-            <a:lvl8pPr marL="3359780" indent="0" algn="ctr">
-              <a:buNone/>
-              <a:defRPr sz="1680"/>
+            <a:lvl8pPr marL="5120640" indent="0" algn="ctr">
+              <a:buNone/>
+              <a:defRPr sz="2560"/>
             </a:lvl8pPr>
-            <a:lvl9pPr marL="3839748" indent="0" algn="ctr">
-              <a:buNone/>
-              <a:defRPr sz="1680"/>
+            <a:lvl9pPr marL="5852160" indent="0" algn="ctr">
+              <a:buNone/>
+              <a:defRPr sz="2560"/>
             </a:lvl9pPr>
           </a:lstStyle>
           <a:p>
@@ -243,7 +243,7 @@
           <a:p>
             <a:fld id="{18A28253-4B93-4F10-A248-DA5D859E28EF}" type="datetimeFigureOut">
               <a:rPr lang="en-US" smtClean="0"/>
-              <a:t>8/8/2016</a:t>
+              <a:t>11/2/2016</a:t>
             </a:fld>
             <a:endParaRPr lang="en-US"/>
           </a:p>
@@ -294,7 +294,7 @@
     </p:spTree>
     <p:extLst>
       <p:ext uri="{BB962C8B-B14F-4D97-AF65-F5344CB8AC3E}">
-        <p14:creationId xmlns:p14="http://schemas.microsoft.com/office/powerpoint/2010/main" val="4152888092"/>
+        <p14:creationId xmlns:p14="http://schemas.microsoft.com/office/powerpoint/2010/main" val="107747886"/>
       </p:ext>
     </p:extLst>
   </p:cSld>
@@ -362,7 +362,7 @@
             <a:pPr lvl="0"/>
             <a:r>
               <a:rPr lang="en-US"/>
-              <a:t>Edit Master text styles</a:t>
+              <a:t>Click to edit Master text styles</a:t>
             </a:r>
           </a:p>
           <a:p>
@@ -413,7 +413,7 @@
           <a:p>
             <a:fld id="{18A28253-4B93-4F10-A248-DA5D859E28EF}" type="datetimeFigureOut">
               <a:rPr lang="en-US" smtClean="0"/>
-              <a:t>8/8/2016</a:t>
+              <a:t>11/2/2016</a:t>
             </a:fld>
             <a:endParaRPr lang="en-US"/>
           </a:p>
@@ -464,7 +464,7 @@
     </p:spTree>
     <p:extLst>
       <p:ext uri="{BB962C8B-B14F-4D97-AF65-F5344CB8AC3E}">
-        <p14:creationId xmlns:p14="http://schemas.microsoft.com/office/powerpoint/2010/main" val="1959945507"/>
+        <p14:creationId xmlns:p14="http://schemas.microsoft.com/office/powerpoint/2010/main" val="3711119502"/>
       </p:ext>
     </p:extLst>
   </p:cSld>
@@ -503,8 +503,8 @@
         </p:nvSpPr>
         <p:spPr>
           <a:xfrm>
-            <a:off x="10351730" y="383297"/>
-            <a:ext cx="3119080" cy="6101085"/>
+            <a:off x="14396085" y="584200"/>
+            <a:ext cx="4337685" cy="9298941"/>
           </a:xfrm>
         </p:spPr>
         <p:txBody>
@@ -531,8 +531,8 @@
         </p:nvSpPr>
         <p:spPr>
           <a:xfrm>
-            <a:off x="994489" y="383297"/>
-            <a:ext cx="9176425" cy="6101085"/>
+            <a:off x="1383030" y="584200"/>
+            <a:ext cx="12761595" cy="9298941"/>
           </a:xfrm>
         </p:spPr>
         <p:txBody>
@@ -542,7 +542,7 @@
             <a:pPr lvl="0"/>
             <a:r>
               <a:rPr lang="en-US"/>
-              <a:t>Edit Master text styles</a:t>
+              <a:t>Click to edit Master text styles</a:t>
             </a:r>
           </a:p>
           <a:p>
@@ -593,7 +593,7 @@
           <a:p>
             <a:fld id="{18A28253-4B93-4F10-A248-DA5D859E28EF}" type="datetimeFigureOut">
               <a:rPr lang="en-US" smtClean="0"/>
-              <a:t>8/8/2016</a:t>
+              <a:t>11/2/2016</a:t>
             </a:fld>
             <a:endParaRPr lang="en-US"/>
           </a:p>
@@ -644,7 +644,7 @@
     </p:spTree>
     <p:extLst>
       <p:ext uri="{BB962C8B-B14F-4D97-AF65-F5344CB8AC3E}">
-        <p14:creationId xmlns:p14="http://schemas.microsoft.com/office/powerpoint/2010/main" val="835483930"/>
+        <p14:creationId xmlns:p14="http://schemas.microsoft.com/office/powerpoint/2010/main" val="2385310594"/>
       </p:ext>
     </p:extLst>
   </p:cSld>
@@ -712,7 +712,7 @@
             <a:pPr lvl="0"/>
             <a:r>
               <a:rPr lang="en-US"/>
-              <a:t>Edit Master text styles</a:t>
+              <a:t>Click to edit Master text styles</a:t>
             </a:r>
           </a:p>
           <a:p>
@@ -763,7 +763,7 @@
           <a:p>
             <a:fld id="{18A28253-4B93-4F10-A248-DA5D859E28EF}" type="datetimeFigureOut">
               <a:rPr lang="en-US" smtClean="0"/>
-              <a:t>8/8/2016</a:t>
+              <a:t>11/2/2016</a:t>
             </a:fld>
             <a:endParaRPr lang="en-US"/>
           </a:p>
@@ -814,7 +814,7 @@
     </p:spTree>
     <p:extLst>
       <p:ext uri="{BB962C8B-B14F-4D97-AF65-F5344CB8AC3E}">
-        <p14:creationId xmlns:p14="http://schemas.microsoft.com/office/powerpoint/2010/main" val="2647176663"/>
+        <p14:creationId xmlns:p14="http://schemas.microsoft.com/office/powerpoint/2010/main" val="2394719846"/>
       </p:ext>
     </p:extLst>
   </p:cSld>
@@ -853,15 +853,15 @@
         </p:nvSpPr>
         <p:spPr>
           <a:xfrm>
-            <a:off x="986955" y="1794830"/>
-            <a:ext cx="12476321" cy="2994714"/>
+            <a:off x="1372553" y="2735582"/>
+            <a:ext cx="17350740" cy="4564379"/>
           </a:xfrm>
         </p:spPr>
         <p:txBody>
           <a:bodyPr anchor="b"/>
           <a:lstStyle>
             <a:lvl1pPr>
-              <a:defRPr sz="6299"/>
+              <a:defRPr sz="9600"/>
             </a:lvl1pPr>
           </a:lstStyle>
           <a:p>
@@ -885,8 +885,8 @@
         </p:nvSpPr>
         <p:spPr>
           <a:xfrm>
-            <a:off x="986955" y="4817875"/>
-            <a:ext cx="12476321" cy="1574849"/>
+            <a:off x="1372553" y="7343142"/>
+            <a:ext cx="17350740" cy="2400299"/>
           </a:xfrm>
         </p:spPr>
         <p:txBody>
@@ -894,7 +894,7 @@
           <a:lstStyle>
             <a:lvl1pPr marL="0" indent="0">
               <a:buNone/>
-              <a:defRPr sz="2520">
+              <a:defRPr sz="3840">
                 <a:solidFill>
                   <a:schemeClr val="tx1">
                     <a:tint val="75000"/>
@@ -902,9 +902,9 @@
                 </a:solidFill>
               </a:defRPr>
             </a:lvl1pPr>
-            <a:lvl2pPr marL="479969" indent="0">
-              <a:buNone/>
-              <a:defRPr sz="2100">
+            <a:lvl2pPr marL="731520" indent="0">
+              <a:buNone/>
+              <a:defRPr sz="3200">
                 <a:solidFill>
                   <a:schemeClr val="tx1">
                     <a:tint val="75000"/>
@@ -912,9 +912,9 @@
                 </a:solidFill>
               </a:defRPr>
             </a:lvl2pPr>
-            <a:lvl3pPr marL="959937" indent="0">
-              <a:buNone/>
-              <a:defRPr sz="1890">
+            <a:lvl3pPr marL="1463040" indent="0">
+              <a:buNone/>
+              <a:defRPr sz="2880">
                 <a:solidFill>
                   <a:schemeClr val="tx1">
                     <a:tint val="75000"/>
@@ -922,9 +922,9 @@
                 </a:solidFill>
               </a:defRPr>
             </a:lvl3pPr>
-            <a:lvl4pPr marL="1439906" indent="0">
-              <a:buNone/>
-              <a:defRPr sz="1680">
+            <a:lvl4pPr marL="2194560" indent="0">
+              <a:buNone/>
+              <a:defRPr sz="2560">
                 <a:solidFill>
                   <a:schemeClr val="tx1">
                     <a:tint val="75000"/>
@@ -932,9 +932,9 @@
                 </a:solidFill>
               </a:defRPr>
             </a:lvl4pPr>
-            <a:lvl5pPr marL="1919874" indent="0">
-              <a:buNone/>
-              <a:defRPr sz="1680">
+            <a:lvl5pPr marL="2926080" indent="0">
+              <a:buNone/>
+              <a:defRPr sz="2560">
                 <a:solidFill>
                   <a:schemeClr val="tx1">
                     <a:tint val="75000"/>
@@ -942,9 +942,9 @@
                 </a:solidFill>
               </a:defRPr>
             </a:lvl5pPr>
-            <a:lvl6pPr marL="2399843" indent="0">
-              <a:buNone/>
-              <a:defRPr sz="1680">
+            <a:lvl6pPr marL="3657600" indent="0">
+              <a:buNone/>
+              <a:defRPr sz="2560">
                 <a:solidFill>
                   <a:schemeClr val="tx1">
                     <a:tint val="75000"/>
@@ -952,9 +952,9 @@
                 </a:solidFill>
               </a:defRPr>
             </a:lvl6pPr>
-            <a:lvl7pPr marL="2879811" indent="0">
-              <a:buNone/>
-              <a:defRPr sz="1680">
+            <a:lvl7pPr marL="4389120" indent="0">
+              <a:buNone/>
+              <a:defRPr sz="2560">
                 <a:solidFill>
                   <a:schemeClr val="tx1">
                     <a:tint val="75000"/>
@@ -962,9 +962,9 @@
                 </a:solidFill>
               </a:defRPr>
             </a:lvl7pPr>
-            <a:lvl8pPr marL="3359780" indent="0">
-              <a:buNone/>
-              <a:defRPr sz="1680">
+            <a:lvl8pPr marL="5120640" indent="0">
+              <a:buNone/>
+              <a:defRPr sz="2560">
                 <a:solidFill>
                   <a:schemeClr val="tx1">
                     <a:tint val="75000"/>
@@ -972,9 +972,9 @@
                 </a:solidFill>
               </a:defRPr>
             </a:lvl8pPr>
-            <a:lvl9pPr marL="3839748" indent="0">
-              <a:buNone/>
-              <a:defRPr sz="1680">
+            <a:lvl9pPr marL="5852160" indent="0">
+              <a:buNone/>
+              <a:defRPr sz="2560">
                 <a:solidFill>
                   <a:schemeClr val="tx1">
                     <a:tint val="75000"/>
@@ -987,7 +987,7 @@
             <a:pPr lvl="0"/>
             <a:r>
               <a:rPr lang="en-US"/>
-              <a:t>Edit Master text styles</a:t>
+              <a:t>Click to edit Master text styles</a:t>
             </a:r>
           </a:p>
         </p:txBody>
@@ -1009,7 +1009,7 @@
           <a:p>
             <a:fld id="{18A28253-4B93-4F10-A248-DA5D859E28EF}" type="datetimeFigureOut">
               <a:rPr lang="en-US" smtClean="0"/>
-              <a:t>8/8/2016</a:t>
+              <a:t>11/2/2016</a:t>
             </a:fld>
             <a:endParaRPr lang="en-US"/>
           </a:p>
@@ -1060,7 +1060,7 @@
     </p:spTree>
     <p:extLst>
       <p:ext uri="{BB962C8B-B14F-4D97-AF65-F5344CB8AC3E}">
-        <p14:creationId xmlns:p14="http://schemas.microsoft.com/office/powerpoint/2010/main" val="1500343186"/>
+        <p14:creationId xmlns:p14="http://schemas.microsoft.com/office/powerpoint/2010/main" val="2697099124"/>
       </p:ext>
     </p:extLst>
   </p:cSld>
@@ -1122,8 +1122,8 @@
         </p:nvSpPr>
         <p:spPr>
           <a:xfrm>
-            <a:off x="994489" y="1916484"/>
-            <a:ext cx="6147753" cy="4567898"/>
+            <a:off x="1383030" y="2921000"/>
+            <a:ext cx="8549640" cy="6962141"/>
           </a:xfrm>
         </p:spPr>
         <p:txBody>
@@ -1133,7 +1133,7 @@
             <a:pPr lvl="0"/>
             <a:r>
               <a:rPr lang="en-US"/>
-              <a:t>Edit Master text styles</a:t>
+              <a:t>Click to edit Master text styles</a:t>
             </a:r>
           </a:p>
           <a:p>
@@ -1179,8 +1179,8 @@
         </p:nvSpPr>
         <p:spPr>
           <a:xfrm>
-            <a:off x="7323058" y="1916484"/>
-            <a:ext cx="6147753" cy="4567898"/>
+            <a:off x="10184130" y="2921000"/>
+            <a:ext cx="8549640" cy="6962141"/>
           </a:xfrm>
         </p:spPr>
         <p:txBody>
@@ -1190,7 +1190,7 @@
             <a:pPr lvl="0"/>
             <a:r>
               <a:rPr lang="en-US"/>
-              <a:t>Edit Master text styles</a:t>
+              <a:t>Click to edit Master text styles</a:t>
             </a:r>
           </a:p>
           <a:p>
@@ -1241,7 +1241,7 @@
           <a:p>
             <a:fld id="{18A28253-4B93-4F10-A248-DA5D859E28EF}" type="datetimeFigureOut">
               <a:rPr lang="en-US" smtClean="0"/>
-              <a:t>8/8/2016</a:t>
+              <a:t>11/2/2016</a:t>
             </a:fld>
             <a:endParaRPr lang="en-US"/>
           </a:p>
@@ -1292,7 +1292,7 @@
     </p:spTree>
     <p:extLst>
       <p:ext uri="{BB962C8B-B14F-4D97-AF65-F5344CB8AC3E}">
-        <p14:creationId xmlns:p14="http://schemas.microsoft.com/office/powerpoint/2010/main" val="875160254"/>
+        <p14:creationId xmlns:p14="http://schemas.microsoft.com/office/powerpoint/2010/main" val="454858316"/>
       </p:ext>
     </p:extLst>
   </p:cSld>
@@ -1331,8 +1331,8 @@
         </p:nvSpPr>
         <p:spPr>
           <a:xfrm>
-            <a:off x="996374" y="383297"/>
-            <a:ext cx="12476321" cy="1391534"/>
+            <a:off x="1385650" y="584201"/>
+            <a:ext cx="17350740" cy="2120901"/>
           </a:xfrm>
         </p:spPr>
         <p:txBody>
@@ -1359,8 +1359,8 @@
         </p:nvSpPr>
         <p:spPr>
           <a:xfrm>
-            <a:off x="996374" y="1764832"/>
-            <a:ext cx="6119499" cy="864917"/>
+            <a:off x="1385651" y="2689861"/>
+            <a:ext cx="8510349" cy="1318259"/>
           </a:xfrm>
         </p:spPr>
         <p:txBody>
@@ -1368,46 +1368,46 @@
           <a:lstStyle>
             <a:lvl1pPr marL="0" indent="0">
               <a:buNone/>
-              <a:defRPr sz="2520" b="1"/>
+              <a:defRPr sz="3840" b="1"/>
             </a:lvl1pPr>
-            <a:lvl2pPr marL="479969" indent="0">
-              <a:buNone/>
-              <a:defRPr sz="2100" b="1"/>
+            <a:lvl2pPr marL="731520" indent="0">
+              <a:buNone/>
+              <a:defRPr sz="3200" b="1"/>
             </a:lvl2pPr>
-            <a:lvl3pPr marL="959937" indent="0">
-              <a:buNone/>
-              <a:defRPr sz="1890" b="1"/>
+            <a:lvl3pPr marL="1463040" indent="0">
+              <a:buNone/>
+              <a:defRPr sz="2880" b="1"/>
             </a:lvl3pPr>
-            <a:lvl4pPr marL="1439906" indent="0">
-              <a:buNone/>
-              <a:defRPr sz="1680" b="1"/>
+            <a:lvl4pPr marL="2194560" indent="0">
+              <a:buNone/>
+              <a:defRPr sz="2560" b="1"/>
             </a:lvl4pPr>
-            <a:lvl5pPr marL="1919874" indent="0">
-              <a:buNone/>
-              <a:defRPr sz="1680" b="1"/>
+            <a:lvl5pPr marL="2926080" indent="0">
+              <a:buNone/>
+              <a:defRPr sz="2560" b="1"/>
             </a:lvl5pPr>
-            <a:lvl6pPr marL="2399843" indent="0">
-              <a:buNone/>
-              <a:defRPr sz="1680" b="1"/>
+            <a:lvl6pPr marL="3657600" indent="0">
+              <a:buNone/>
+              <a:defRPr sz="2560" b="1"/>
             </a:lvl6pPr>
-            <a:lvl7pPr marL="2879811" indent="0">
-              <a:buNone/>
-              <a:defRPr sz="1680" b="1"/>
+            <a:lvl7pPr marL="4389120" indent="0">
+              <a:buNone/>
+              <a:defRPr sz="2560" b="1"/>
             </a:lvl7pPr>
-            <a:lvl8pPr marL="3359780" indent="0">
-              <a:buNone/>
-              <a:defRPr sz="1680" b="1"/>
+            <a:lvl8pPr marL="5120640" indent="0">
+              <a:buNone/>
+              <a:defRPr sz="2560" b="1"/>
             </a:lvl8pPr>
-            <a:lvl9pPr marL="3839748" indent="0">
-              <a:buNone/>
-              <a:defRPr sz="1680" b="1"/>
+            <a:lvl9pPr marL="5852160" indent="0">
+              <a:buNone/>
+              <a:defRPr sz="2560" b="1"/>
             </a:lvl9pPr>
           </a:lstStyle>
           <a:p>
             <a:pPr lvl="0"/>
             <a:r>
               <a:rPr lang="en-US"/>
-              <a:t>Edit Master text styles</a:t>
+              <a:t>Click to edit Master text styles</a:t>
             </a:r>
           </a:p>
         </p:txBody>
@@ -1424,8 +1424,8 @@
         </p:nvSpPr>
         <p:spPr>
           <a:xfrm>
-            <a:off x="996374" y="2629749"/>
-            <a:ext cx="6119499" cy="3867965"/>
+            <a:off x="1385651" y="4008120"/>
+            <a:ext cx="8510349" cy="5895341"/>
           </a:xfrm>
         </p:spPr>
         <p:txBody>
@@ -1435,7 +1435,7 @@
             <a:pPr lvl="0"/>
             <a:r>
               <a:rPr lang="en-US"/>
-              <a:t>Edit Master text styles</a:t>
+              <a:t>Click to edit Master text styles</a:t>
             </a:r>
           </a:p>
           <a:p>
@@ -1481,8 +1481,8 @@
         </p:nvSpPr>
         <p:spPr>
           <a:xfrm>
-            <a:off x="7323058" y="1764832"/>
-            <a:ext cx="6149637" cy="864917"/>
+            <a:off x="10184130" y="2689861"/>
+            <a:ext cx="8552260" cy="1318259"/>
           </a:xfrm>
         </p:spPr>
         <p:txBody>
@@ -1490,46 +1490,46 @@
           <a:lstStyle>
             <a:lvl1pPr marL="0" indent="0">
               <a:buNone/>
-              <a:defRPr sz="2520" b="1"/>
+              <a:defRPr sz="3840" b="1"/>
             </a:lvl1pPr>
-            <a:lvl2pPr marL="479969" indent="0">
-              <a:buNone/>
-              <a:defRPr sz="2100" b="1"/>
+            <a:lvl2pPr marL="731520" indent="0">
+              <a:buNone/>
+              <a:defRPr sz="3200" b="1"/>
             </a:lvl2pPr>
-            <a:lvl3pPr marL="959937" indent="0">
-              <a:buNone/>
-              <a:defRPr sz="1890" b="1"/>
+            <a:lvl3pPr marL="1463040" indent="0">
+              <a:buNone/>
+              <a:defRPr sz="2880" b="1"/>
             </a:lvl3pPr>
-            <a:lvl4pPr marL="1439906" indent="0">
-              <a:buNone/>
-              <a:defRPr sz="1680" b="1"/>
+            <a:lvl4pPr marL="2194560" indent="0">
+              <a:buNone/>
+              <a:defRPr sz="2560" b="1"/>
             </a:lvl4pPr>
-            <a:lvl5pPr marL="1919874" indent="0">
-              <a:buNone/>
-              <a:defRPr sz="1680" b="1"/>
+            <a:lvl5pPr marL="2926080" indent="0">
+              <a:buNone/>
+              <a:defRPr sz="2560" b="1"/>
             </a:lvl5pPr>
-            <a:lvl6pPr marL="2399843" indent="0">
-              <a:buNone/>
-              <a:defRPr sz="1680" b="1"/>
+            <a:lvl6pPr marL="3657600" indent="0">
+              <a:buNone/>
+              <a:defRPr sz="2560" b="1"/>
             </a:lvl6pPr>
-            <a:lvl7pPr marL="2879811" indent="0">
-              <a:buNone/>
-              <a:defRPr sz="1680" b="1"/>
+            <a:lvl7pPr marL="4389120" indent="0">
+              <a:buNone/>
+              <a:defRPr sz="2560" b="1"/>
             </a:lvl7pPr>
-            <a:lvl8pPr marL="3359780" indent="0">
-              <a:buNone/>
-              <a:defRPr sz="1680" b="1"/>
+            <a:lvl8pPr marL="5120640" indent="0">
+              <a:buNone/>
+              <a:defRPr sz="2560" b="1"/>
             </a:lvl8pPr>
-            <a:lvl9pPr marL="3839748" indent="0">
-              <a:buNone/>
-              <a:defRPr sz="1680" b="1"/>
+            <a:lvl9pPr marL="5852160" indent="0">
+              <a:buNone/>
+              <a:defRPr sz="2560" b="1"/>
             </a:lvl9pPr>
           </a:lstStyle>
           <a:p>
             <a:pPr lvl="0"/>
             <a:r>
               <a:rPr lang="en-US"/>
-              <a:t>Edit Master text styles</a:t>
+              <a:t>Click to edit Master text styles</a:t>
             </a:r>
           </a:p>
         </p:txBody>
@@ -1546,8 +1546,8 @@
         </p:nvSpPr>
         <p:spPr>
           <a:xfrm>
-            <a:off x="7323058" y="2629749"/>
-            <a:ext cx="6149637" cy="3867965"/>
+            <a:off x="10184130" y="4008120"/>
+            <a:ext cx="8552260" cy="5895341"/>
           </a:xfrm>
         </p:spPr>
         <p:txBody>
@@ -1557,7 +1557,7 @@
             <a:pPr lvl="0"/>
             <a:r>
               <a:rPr lang="en-US"/>
-              <a:t>Edit Master text styles</a:t>
+              <a:t>Click to edit Master text styles</a:t>
             </a:r>
           </a:p>
           <a:p>
@@ -1608,7 +1608,7 @@
           <a:p>
             <a:fld id="{18A28253-4B93-4F10-A248-DA5D859E28EF}" type="datetimeFigureOut">
               <a:rPr lang="en-US" smtClean="0"/>
-              <a:t>8/8/2016</a:t>
+              <a:t>11/2/2016</a:t>
             </a:fld>
             <a:endParaRPr lang="en-US"/>
           </a:p>
@@ -1659,7 +1659,7 @@
     </p:spTree>
     <p:extLst>
       <p:ext uri="{BB962C8B-B14F-4D97-AF65-F5344CB8AC3E}">
-        <p14:creationId xmlns:p14="http://schemas.microsoft.com/office/powerpoint/2010/main" val="1424008510"/>
+        <p14:creationId xmlns:p14="http://schemas.microsoft.com/office/powerpoint/2010/main" val="2020189832"/>
       </p:ext>
     </p:extLst>
   </p:cSld>
@@ -1726,7 +1726,7 @@
           <a:p>
             <a:fld id="{18A28253-4B93-4F10-A248-DA5D859E28EF}" type="datetimeFigureOut">
               <a:rPr lang="en-US" smtClean="0"/>
-              <a:t>8/8/2016</a:t>
+              <a:t>11/2/2016</a:t>
             </a:fld>
             <a:endParaRPr lang="en-US"/>
           </a:p>
@@ -1777,7 +1777,7 @@
     </p:spTree>
     <p:extLst>
       <p:ext uri="{BB962C8B-B14F-4D97-AF65-F5344CB8AC3E}">
-        <p14:creationId xmlns:p14="http://schemas.microsoft.com/office/powerpoint/2010/main" val="1303176458"/>
+        <p14:creationId xmlns:p14="http://schemas.microsoft.com/office/powerpoint/2010/main" val="1204457566"/>
       </p:ext>
     </p:extLst>
   </p:cSld>
@@ -1821,7 +1821,7 @@
           <a:p>
             <a:fld id="{18A28253-4B93-4F10-A248-DA5D859E28EF}" type="datetimeFigureOut">
               <a:rPr lang="en-US" smtClean="0"/>
-              <a:t>8/8/2016</a:t>
+              <a:t>11/2/2016</a:t>
             </a:fld>
             <a:endParaRPr lang="en-US"/>
           </a:p>
@@ -1872,7 +1872,7 @@
     </p:spTree>
     <p:extLst>
       <p:ext uri="{BB962C8B-B14F-4D97-AF65-F5344CB8AC3E}">
-        <p14:creationId xmlns:p14="http://schemas.microsoft.com/office/powerpoint/2010/main" val="3749835708"/>
+        <p14:creationId xmlns:p14="http://schemas.microsoft.com/office/powerpoint/2010/main" val="3166925921"/>
       </p:ext>
     </p:extLst>
   </p:cSld>
@@ -1911,15 +1911,15 @@
         </p:nvSpPr>
         <p:spPr>
           <a:xfrm>
-            <a:off x="996374" y="479954"/>
-            <a:ext cx="4665435" cy="1679840"/>
+            <a:off x="1385651" y="731520"/>
+            <a:ext cx="6488191" cy="2560320"/>
           </a:xfrm>
         </p:spPr>
         <p:txBody>
           <a:bodyPr anchor="b"/>
           <a:lstStyle>
             <a:lvl1pPr>
-              <a:defRPr sz="3359"/>
+              <a:defRPr sz="5120"/>
             </a:lvl1pPr>
           </a:lstStyle>
           <a:p>
@@ -1943,46 +1943,46 @@
         </p:nvSpPr>
         <p:spPr>
           <a:xfrm>
-            <a:off x="6149637" y="1036569"/>
-            <a:ext cx="7323058" cy="5116178"/>
+            <a:off x="8552260" y="1579881"/>
+            <a:ext cx="10184130" cy="7797800"/>
           </a:xfrm>
         </p:spPr>
         <p:txBody>
           <a:bodyPr/>
           <a:lstStyle>
             <a:lvl1pPr>
-              <a:defRPr sz="3359"/>
+              <a:defRPr sz="5120"/>
             </a:lvl1pPr>
             <a:lvl2pPr>
-              <a:defRPr sz="2939"/>
+              <a:defRPr sz="4480"/>
             </a:lvl2pPr>
             <a:lvl3pPr>
-              <a:defRPr sz="2520"/>
+              <a:defRPr sz="3840"/>
             </a:lvl3pPr>
             <a:lvl4pPr>
-              <a:defRPr sz="2100"/>
+              <a:defRPr sz="3200"/>
             </a:lvl4pPr>
             <a:lvl5pPr>
-              <a:defRPr sz="2100"/>
+              <a:defRPr sz="3200"/>
             </a:lvl5pPr>
             <a:lvl6pPr>
-              <a:defRPr sz="2100"/>
+              <a:defRPr sz="3200"/>
             </a:lvl6pPr>
             <a:lvl7pPr>
-              <a:defRPr sz="2100"/>
+              <a:defRPr sz="3200"/>
             </a:lvl7pPr>
             <a:lvl8pPr>
-              <a:defRPr sz="2100"/>
+              <a:defRPr sz="3200"/>
             </a:lvl8pPr>
             <a:lvl9pPr>
-              <a:defRPr sz="2100"/>
+              <a:defRPr sz="3200"/>
             </a:lvl9pPr>
           </a:lstStyle>
           <a:p>
             <a:pPr lvl="0"/>
             <a:r>
               <a:rPr lang="en-US"/>
-              <a:t>Edit Master text styles</a:t>
+              <a:t>Click to edit Master text styles</a:t>
             </a:r>
           </a:p>
           <a:p>
@@ -2028,8 +2028,8 @@
         </p:nvSpPr>
         <p:spPr>
           <a:xfrm>
-            <a:off x="996374" y="2159794"/>
-            <a:ext cx="4665435" cy="4001285"/>
+            <a:off x="1385651" y="3291840"/>
+            <a:ext cx="6488191" cy="6098541"/>
           </a:xfrm>
         </p:spPr>
         <p:txBody>
@@ -2037,46 +2037,46 @@
           <a:lstStyle>
             <a:lvl1pPr marL="0" indent="0">
               <a:buNone/>
-              <a:defRPr sz="1680"/>
+              <a:defRPr sz="2560"/>
             </a:lvl1pPr>
-            <a:lvl2pPr marL="479969" indent="0">
-              <a:buNone/>
-              <a:defRPr sz="1470"/>
+            <a:lvl2pPr marL="731520" indent="0">
+              <a:buNone/>
+              <a:defRPr sz="2240"/>
             </a:lvl2pPr>
-            <a:lvl3pPr marL="959937" indent="0">
-              <a:buNone/>
-              <a:defRPr sz="1260"/>
+            <a:lvl3pPr marL="1463040" indent="0">
+              <a:buNone/>
+              <a:defRPr sz="1920"/>
             </a:lvl3pPr>
-            <a:lvl4pPr marL="1439906" indent="0">
-              <a:buNone/>
-              <a:defRPr sz="1050"/>
+            <a:lvl4pPr marL="2194560" indent="0">
+              <a:buNone/>
+              <a:defRPr sz="1600"/>
             </a:lvl4pPr>
-            <a:lvl5pPr marL="1919874" indent="0">
-              <a:buNone/>
-              <a:defRPr sz="1050"/>
+            <a:lvl5pPr marL="2926080" indent="0">
+              <a:buNone/>
+              <a:defRPr sz="1600"/>
             </a:lvl5pPr>
-            <a:lvl6pPr marL="2399843" indent="0">
-              <a:buNone/>
-              <a:defRPr sz="1050"/>
+            <a:lvl6pPr marL="3657600" indent="0">
+              <a:buNone/>
+              <a:defRPr sz="1600"/>
             </a:lvl6pPr>
-            <a:lvl7pPr marL="2879811" indent="0">
-              <a:buNone/>
-              <a:defRPr sz="1050"/>
+            <a:lvl7pPr marL="4389120" indent="0">
+              <a:buNone/>
+              <a:defRPr sz="1600"/>
             </a:lvl7pPr>
-            <a:lvl8pPr marL="3359780" indent="0">
-              <a:buNone/>
-              <a:defRPr sz="1050"/>
+            <a:lvl8pPr marL="5120640" indent="0">
+              <a:buNone/>
+              <a:defRPr sz="1600"/>
             </a:lvl8pPr>
-            <a:lvl9pPr marL="3839748" indent="0">
-              <a:buNone/>
-              <a:defRPr sz="1050"/>
+            <a:lvl9pPr marL="5852160" indent="0">
+              <a:buNone/>
+              <a:defRPr sz="1600"/>
             </a:lvl9pPr>
           </a:lstStyle>
           <a:p>
             <a:pPr lvl="0"/>
             <a:r>
               <a:rPr lang="en-US"/>
-              <a:t>Edit Master text styles</a:t>
+              <a:t>Click to edit Master text styles</a:t>
             </a:r>
           </a:p>
         </p:txBody>
@@ -2098,7 +2098,7 @@
           <a:p>
             <a:fld id="{18A28253-4B93-4F10-A248-DA5D859E28EF}" type="datetimeFigureOut">
               <a:rPr lang="en-US" smtClean="0"/>
-              <a:t>8/8/2016</a:t>
+              <a:t>11/2/2016</a:t>
             </a:fld>
             <a:endParaRPr lang="en-US"/>
           </a:p>
@@ -2149,7 +2149,7 @@
     </p:spTree>
     <p:extLst>
       <p:ext uri="{BB962C8B-B14F-4D97-AF65-F5344CB8AC3E}">
-        <p14:creationId xmlns:p14="http://schemas.microsoft.com/office/powerpoint/2010/main" val="1091229206"/>
+        <p14:creationId xmlns:p14="http://schemas.microsoft.com/office/powerpoint/2010/main" val="3082143003"/>
       </p:ext>
     </p:extLst>
   </p:cSld>
@@ -2188,15 +2188,15 @@
         </p:nvSpPr>
         <p:spPr>
           <a:xfrm>
-            <a:off x="996374" y="479954"/>
-            <a:ext cx="4665435" cy="1679840"/>
+            <a:off x="1385651" y="731520"/>
+            <a:ext cx="6488191" cy="2560320"/>
           </a:xfrm>
         </p:spPr>
         <p:txBody>
           <a:bodyPr anchor="b"/>
           <a:lstStyle>
             <a:lvl1pPr>
-              <a:defRPr sz="3359"/>
+              <a:defRPr sz="5120"/>
             </a:lvl1pPr>
           </a:lstStyle>
           <a:p>
@@ -2220,8 +2220,8 @@
         </p:nvSpPr>
         <p:spPr>
           <a:xfrm>
-            <a:off x="6149637" y="1036569"/>
-            <a:ext cx="7323058" cy="5116178"/>
+            <a:off x="8552260" y="1579881"/>
+            <a:ext cx="10184130" cy="7797800"/>
           </a:xfrm>
         </p:spPr>
         <p:txBody>
@@ -2229,39 +2229,39 @@
           <a:lstStyle>
             <a:lvl1pPr marL="0" indent="0">
               <a:buNone/>
-              <a:defRPr sz="3359"/>
+              <a:defRPr sz="5120"/>
             </a:lvl1pPr>
-            <a:lvl2pPr marL="479969" indent="0">
-              <a:buNone/>
-              <a:defRPr sz="2939"/>
+            <a:lvl2pPr marL="731520" indent="0">
+              <a:buNone/>
+              <a:defRPr sz="4480"/>
             </a:lvl2pPr>
-            <a:lvl3pPr marL="959937" indent="0">
-              <a:buNone/>
-              <a:defRPr sz="2520"/>
+            <a:lvl3pPr marL="1463040" indent="0">
+              <a:buNone/>
+              <a:defRPr sz="3840"/>
             </a:lvl3pPr>
-            <a:lvl4pPr marL="1439906" indent="0">
-              <a:buNone/>
-              <a:defRPr sz="2100"/>
+            <a:lvl4pPr marL="2194560" indent="0">
+              <a:buNone/>
+              <a:defRPr sz="3200"/>
             </a:lvl4pPr>
-            <a:lvl5pPr marL="1919874" indent="0">
-              <a:buNone/>
-              <a:defRPr sz="2100"/>
+            <a:lvl5pPr marL="2926080" indent="0">
+              <a:buNone/>
+              <a:defRPr sz="3200"/>
             </a:lvl5pPr>
-            <a:lvl6pPr marL="2399843" indent="0">
-              <a:buNone/>
-              <a:defRPr sz="2100"/>
+            <a:lvl6pPr marL="3657600" indent="0">
+              <a:buNone/>
+              <a:defRPr sz="3200"/>
             </a:lvl6pPr>
-            <a:lvl7pPr marL="2879811" indent="0">
-              <a:buNone/>
-              <a:defRPr sz="2100"/>
+            <a:lvl7pPr marL="4389120" indent="0">
+              <a:buNone/>
+              <a:defRPr sz="3200"/>
             </a:lvl7pPr>
-            <a:lvl8pPr marL="3359780" indent="0">
-              <a:buNone/>
-              <a:defRPr sz="2100"/>
+            <a:lvl8pPr marL="5120640" indent="0">
+              <a:buNone/>
+              <a:defRPr sz="3200"/>
             </a:lvl8pPr>
-            <a:lvl9pPr marL="3839748" indent="0">
-              <a:buNone/>
-              <a:defRPr sz="2100"/>
+            <a:lvl9pPr marL="5852160" indent="0">
+              <a:buNone/>
+              <a:defRPr sz="3200"/>
             </a:lvl9pPr>
           </a:lstStyle>
           <a:p>
@@ -2285,8 +2285,8 @@
         </p:nvSpPr>
         <p:spPr>
           <a:xfrm>
-            <a:off x="996374" y="2159794"/>
-            <a:ext cx="4665435" cy="4001285"/>
+            <a:off x="1385651" y="3291840"/>
+            <a:ext cx="6488191" cy="6098541"/>
           </a:xfrm>
         </p:spPr>
         <p:txBody>
@@ -2294,46 +2294,46 @@
           <a:lstStyle>
             <a:lvl1pPr marL="0" indent="0">
               <a:buNone/>
-              <a:defRPr sz="1680"/>
+              <a:defRPr sz="2560"/>
             </a:lvl1pPr>
-            <a:lvl2pPr marL="479969" indent="0">
-              <a:buNone/>
-              <a:defRPr sz="1470"/>
+            <a:lvl2pPr marL="731520" indent="0">
+              <a:buNone/>
+              <a:defRPr sz="2240"/>
             </a:lvl2pPr>
-            <a:lvl3pPr marL="959937" indent="0">
-              <a:buNone/>
-              <a:defRPr sz="1260"/>
+            <a:lvl3pPr marL="1463040" indent="0">
+              <a:buNone/>
+              <a:defRPr sz="1920"/>
             </a:lvl3pPr>
-            <a:lvl4pPr marL="1439906" indent="0">
-              <a:buNone/>
-              <a:defRPr sz="1050"/>
+            <a:lvl4pPr marL="2194560" indent="0">
+              <a:buNone/>
+              <a:defRPr sz="1600"/>
             </a:lvl4pPr>
-            <a:lvl5pPr marL="1919874" indent="0">
-              <a:buNone/>
-              <a:defRPr sz="1050"/>
+            <a:lvl5pPr marL="2926080" indent="0">
+              <a:buNone/>
+              <a:defRPr sz="1600"/>
             </a:lvl5pPr>
-            <a:lvl6pPr marL="2399843" indent="0">
-              <a:buNone/>
-              <a:defRPr sz="1050"/>
+            <a:lvl6pPr marL="3657600" indent="0">
+              <a:buNone/>
+              <a:defRPr sz="1600"/>
             </a:lvl6pPr>
-            <a:lvl7pPr marL="2879811" indent="0">
-              <a:buNone/>
-              <a:defRPr sz="1050"/>
+            <a:lvl7pPr marL="4389120" indent="0">
+              <a:buNone/>
+              <a:defRPr sz="1600"/>
             </a:lvl7pPr>
-            <a:lvl8pPr marL="3359780" indent="0">
-              <a:buNone/>
-              <a:defRPr sz="1050"/>
+            <a:lvl8pPr marL="5120640" indent="0">
+              <a:buNone/>
+              <a:defRPr sz="1600"/>
             </a:lvl8pPr>
-            <a:lvl9pPr marL="3839748" indent="0">
-              <a:buNone/>
-              <a:defRPr sz="1050"/>
+            <a:lvl9pPr marL="5852160" indent="0">
+              <a:buNone/>
+              <a:defRPr sz="1600"/>
             </a:lvl9pPr>
           </a:lstStyle>
           <a:p>
             <a:pPr lvl="0"/>
             <a:r>
               <a:rPr lang="en-US"/>
-              <a:t>Edit Master text styles</a:t>
+              <a:t>Click to edit Master text styles</a:t>
             </a:r>
           </a:p>
         </p:txBody>
@@ -2355,7 +2355,7 @@
           <a:p>
             <a:fld id="{18A28253-4B93-4F10-A248-DA5D859E28EF}" type="datetimeFigureOut">
               <a:rPr lang="en-US" smtClean="0"/>
-              <a:t>8/8/2016</a:t>
+              <a:t>11/2/2016</a:t>
             </a:fld>
             <a:endParaRPr lang="en-US"/>
           </a:p>
@@ -2406,7 +2406,7 @@
     </p:spTree>
     <p:extLst>
       <p:ext uri="{BB962C8B-B14F-4D97-AF65-F5344CB8AC3E}">
-        <p14:creationId xmlns:p14="http://schemas.microsoft.com/office/powerpoint/2010/main" val="3264758650"/>
+        <p14:creationId xmlns:p14="http://schemas.microsoft.com/office/powerpoint/2010/main" val="4185042374"/>
       </p:ext>
     </p:extLst>
   </p:cSld>
@@ -2450,8 +2450,8 @@
         </p:nvSpPr>
         <p:spPr>
           <a:xfrm>
-            <a:off x="994490" y="383297"/>
-            <a:ext cx="12476321" cy="1391534"/>
+            <a:off x="1383030" y="584201"/>
+            <a:ext cx="17350740" cy="2120901"/>
           </a:xfrm>
           <a:prstGeom prst="rect">
             <a:avLst/>
@@ -2483,8 +2483,8 @@
         </p:nvSpPr>
         <p:spPr>
           <a:xfrm>
-            <a:off x="994490" y="1916484"/>
-            <a:ext cx="12476321" cy="4567898"/>
+            <a:off x="1383030" y="2921000"/>
+            <a:ext cx="17350740" cy="6962141"/>
           </a:xfrm>
           <a:prstGeom prst="rect">
             <a:avLst/>
@@ -2499,7 +2499,7 @@
             <a:pPr lvl="0"/>
             <a:r>
               <a:rPr lang="en-US"/>
-              <a:t>Edit Master text styles</a:t>
+              <a:t>Click to edit Master text styles</a:t>
             </a:r>
           </a:p>
           <a:p>
@@ -2545,8 +2545,8 @@
         </p:nvSpPr>
         <p:spPr>
           <a:xfrm>
-            <a:off x="994489" y="6672697"/>
-            <a:ext cx="3254693" cy="383297"/>
+            <a:off x="1383030" y="10170161"/>
+            <a:ext cx="4526280" cy="584200"/>
           </a:xfrm>
           <a:prstGeom prst="rect">
             <a:avLst/>
@@ -2556,7 +2556,7 @@
           <a:bodyPr vert="horz" lIns="91440" tIns="45720" rIns="91440" bIns="45720" rtlCol="0" anchor="ctr"/>
           <a:lstStyle>
             <a:lvl1pPr algn="l">
-              <a:defRPr sz="1260">
+              <a:defRPr sz="1920">
                 <a:solidFill>
                   <a:schemeClr val="tx1">
                     <a:tint val="75000"/>
@@ -2568,7 +2568,7 @@
           <a:p>
             <a:fld id="{18A28253-4B93-4F10-A248-DA5D859E28EF}" type="datetimeFigureOut">
               <a:rPr lang="en-US" smtClean="0"/>
-              <a:t>8/8/2016</a:t>
+              <a:t>11/2/2016</a:t>
             </a:fld>
             <a:endParaRPr lang="en-US"/>
           </a:p>
@@ -2586,8 +2586,8 @@
         </p:nvSpPr>
         <p:spPr>
           <a:xfrm>
-            <a:off x="4791631" y="6672697"/>
-            <a:ext cx="4882039" cy="383297"/>
+            <a:off x="6663690" y="10170161"/>
+            <a:ext cx="6789420" cy="584200"/>
           </a:xfrm>
           <a:prstGeom prst="rect">
             <a:avLst/>
@@ -2597,7 +2597,7 @@
           <a:bodyPr vert="horz" lIns="91440" tIns="45720" rIns="91440" bIns="45720" rtlCol="0" anchor="ctr"/>
           <a:lstStyle>
             <a:lvl1pPr algn="ctr">
-              <a:defRPr sz="1260">
+              <a:defRPr sz="1920">
                 <a:solidFill>
                   <a:schemeClr val="tx1">
                     <a:tint val="75000"/>
@@ -2623,8 +2623,8 @@
         </p:nvSpPr>
         <p:spPr>
           <a:xfrm>
-            <a:off x="10216118" y="6672697"/>
-            <a:ext cx="3254693" cy="383297"/>
+            <a:off x="14207490" y="10170161"/>
+            <a:ext cx="4526280" cy="584200"/>
           </a:xfrm>
           <a:prstGeom prst="rect">
             <a:avLst/>
@@ -2634,7 +2634,7 @@
           <a:bodyPr vert="horz" lIns="91440" tIns="45720" rIns="91440" bIns="45720" rtlCol="0" anchor="ctr"/>
           <a:lstStyle>
             <a:lvl1pPr algn="r">
-              <a:defRPr sz="1260">
+              <a:defRPr sz="1920">
                 <a:solidFill>
                   <a:schemeClr val="tx1">
                     <a:tint val="75000"/>
@@ -2655,27 +2655,27 @@
     </p:spTree>
     <p:extLst>
       <p:ext uri="{BB962C8B-B14F-4D97-AF65-F5344CB8AC3E}">
-        <p14:creationId xmlns:p14="http://schemas.microsoft.com/office/powerpoint/2010/main" val="1242812400"/>
+        <p14:creationId xmlns:p14="http://schemas.microsoft.com/office/powerpoint/2010/main" val="1674676433"/>
       </p:ext>
     </p:extLst>
   </p:cSld>
   <p:clrMap bg1="lt1" tx1="dk1" bg2="lt2" tx2="dk2" accent1="accent1" accent2="accent2" accent3="accent3" accent4="accent4" accent5="accent5" accent6="accent6" hlink="hlink" folHlink="folHlink"/>
   <p:sldLayoutIdLst>
-    <p:sldLayoutId id="2147483817" r:id="rId1"/>
-    <p:sldLayoutId id="2147483818" r:id="rId2"/>
-    <p:sldLayoutId id="2147483819" r:id="rId3"/>
-    <p:sldLayoutId id="2147483820" r:id="rId4"/>
-    <p:sldLayoutId id="2147483821" r:id="rId5"/>
-    <p:sldLayoutId id="2147483822" r:id="rId6"/>
-    <p:sldLayoutId id="2147483823" r:id="rId7"/>
-    <p:sldLayoutId id="2147483824" r:id="rId8"/>
-    <p:sldLayoutId id="2147483825" r:id="rId9"/>
-    <p:sldLayoutId id="2147483826" r:id="rId10"/>
-    <p:sldLayoutId id="2147483827" r:id="rId11"/>
+    <p:sldLayoutId id="2147483877" r:id="rId1"/>
+    <p:sldLayoutId id="2147483878" r:id="rId2"/>
+    <p:sldLayoutId id="2147483879" r:id="rId3"/>
+    <p:sldLayoutId id="2147483880" r:id="rId4"/>
+    <p:sldLayoutId id="2147483881" r:id="rId5"/>
+    <p:sldLayoutId id="2147483882" r:id="rId6"/>
+    <p:sldLayoutId id="2147483883" r:id="rId7"/>
+    <p:sldLayoutId id="2147483884" r:id="rId8"/>
+    <p:sldLayoutId id="2147483885" r:id="rId9"/>
+    <p:sldLayoutId id="2147483886" r:id="rId10"/>
+    <p:sldLayoutId id="2147483887" r:id="rId11"/>
   </p:sldLayoutIdLst>
   <p:txStyles>
     <p:titleStyle>
-      <a:lvl1pPr algn="l" defTabSz="959937" rtl="0" eaLnBrk="1" latinLnBrk="0" hangingPunct="1">
+      <a:lvl1pPr algn="l" defTabSz="1463040" rtl="0" eaLnBrk="1" latinLnBrk="0" hangingPunct="1">
         <a:lnSpc>
           <a:spcPct val="90000"/>
         </a:lnSpc>
@@ -2683,7 +2683,7 @@
           <a:spcPct val="0"/>
         </a:spcBef>
         <a:buNone/>
-        <a:defRPr sz="4619" kern="1200">
+        <a:defRPr sz="7040" kern="1200">
           <a:solidFill>
             <a:schemeClr val="tx1"/>
           </a:solidFill>
@@ -2694,16 +2694,16 @@
       </a:lvl1pPr>
     </p:titleStyle>
     <p:bodyStyle>
-      <a:lvl1pPr marL="239984" indent="-239984" algn="l" defTabSz="959937" rtl="0" eaLnBrk="1" latinLnBrk="0" hangingPunct="1">
+      <a:lvl1pPr marL="365760" indent="-365760" algn="l" defTabSz="1463040" rtl="0" eaLnBrk="1" latinLnBrk="0" hangingPunct="1">
         <a:lnSpc>
           <a:spcPct val="90000"/>
         </a:lnSpc>
         <a:spcBef>
-          <a:spcPts val="1050"/>
+          <a:spcPts val="1600"/>
         </a:spcBef>
         <a:buFont typeface="Arial" panose="020B0604020202020204" pitchFamily="34" charset="0"/>
         <a:buChar char="•"/>
-        <a:defRPr sz="2939" kern="1200">
+        <a:defRPr sz="4480" kern="1200">
           <a:solidFill>
             <a:schemeClr val="tx1"/>
           </a:solidFill>
@@ -2712,16 +2712,16 @@
           <a:cs typeface="+mn-cs"/>
         </a:defRPr>
       </a:lvl1pPr>
-      <a:lvl2pPr marL="719953" indent="-239984" algn="l" defTabSz="959937" rtl="0" eaLnBrk="1" latinLnBrk="0" hangingPunct="1">
+      <a:lvl2pPr marL="1097280" indent="-365760" algn="l" defTabSz="1463040" rtl="0" eaLnBrk="1" latinLnBrk="0" hangingPunct="1">
         <a:lnSpc>
           <a:spcPct val="90000"/>
         </a:lnSpc>
         <a:spcBef>
-          <a:spcPts val="525"/>
+          <a:spcPts val="800"/>
         </a:spcBef>
         <a:buFont typeface="Arial" panose="020B0604020202020204" pitchFamily="34" charset="0"/>
         <a:buChar char="•"/>
-        <a:defRPr sz="2520" kern="1200">
+        <a:defRPr sz="3840" kern="1200">
           <a:solidFill>
             <a:schemeClr val="tx1"/>
           </a:solidFill>
@@ -2730,16 +2730,16 @@
           <a:cs typeface="+mn-cs"/>
         </a:defRPr>
       </a:lvl2pPr>
-      <a:lvl3pPr marL="1199921" indent="-239984" algn="l" defTabSz="959937" rtl="0" eaLnBrk="1" latinLnBrk="0" hangingPunct="1">
+      <a:lvl3pPr marL="1828800" indent="-365760" algn="l" defTabSz="1463040" rtl="0" eaLnBrk="1" latinLnBrk="0" hangingPunct="1">
         <a:lnSpc>
           <a:spcPct val="90000"/>
         </a:lnSpc>
         <a:spcBef>
-          <a:spcPts val="525"/>
+          <a:spcPts val="800"/>
         </a:spcBef>
         <a:buFont typeface="Arial" panose="020B0604020202020204" pitchFamily="34" charset="0"/>
         <a:buChar char="•"/>
-        <a:defRPr sz="2100" kern="1200">
+        <a:defRPr sz="3200" kern="1200">
           <a:solidFill>
             <a:schemeClr val="tx1"/>
           </a:solidFill>
@@ -2748,16 +2748,16 @@
           <a:cs typeface="+mn-cs"/>
         </a:defRPr>
       </a:lvl3pPr>
-      <a:lvl4pPr marL="1679890" indent="-239984" algn="l" defTabSz="959937" rtl="0" eaLnBrk="1" latinLnBrk="0" hangingPunct="1">
+      <a:lvl4pPr marL="2560320" indent="-365760" algn="l" defTabSz="1463040" rtl="0" eaLnBrk="1" latinLnBrk="0" hangingPunct="1">
         <a:lnSpc>
           <a:spcPct val="90000"/>
         </a:lnSpc>
         <a:spcBef>
-          <a:spcPts val="525"/>
+          <a:spcPts val="800"/>
         </a:spcBef>
         <a:buFont typeface="Arial" panose="020B0604020202020204" pitchFamily="34" charset="0"/>
         <a:buChar char="•"/>
-        <a:defRPr sz="1890" kern="1200">
+        <a:defRPr sz="2880" kern="1200">
           <a:solidFill>
             <a:schemeClr val="tx1"/>
           </a:solidFill>
@@ -2766,16 +2766,16 @@
           <a:cs typeface="+mn-cs"/>
         </a:defRPr>
       </a:lvl4pPr>
-      <a:lvl5pPr marL="2159859" indent="-239984" algn="l" defTabSz="959937" rtl="0" eaLnBrk="1" latinLnBrk="0" hangingPunct="1">
+      <a:lvl5pPr marL="3291840" indent="-365760" algn="l" defTabSz="1463040" rtl="0" eaLnBrk="1" latinLnBrk="0" hangingPunct="1">
         <a:lnSpc>
           <a:spcPct val="90000"/>
         </a:lnSpc>
         <a:spcBef>
-          <a:spcPts val="525"/>
+          <a:spcPts val="800"/>
         </a:spcBef>
         <a:buFont typeface="Arial" panose="020B0604020202020204" pitchFamily="34" charset="0"/>
         <a:buChar char="•"/>
-        <a:defRPr sz="1890" kern="1200">
+        <a:defRPr sz="2880" kern="1200">
           <a:solidFill>
             <a:schemeClr val="tx1"/>
           </a:solidFill>
@@ -2784,16 +2784,16 @@
           <a:cs typeface="+mn-cs"/>
         </a:defRPr>
       </a:lvl5pPr>
-      <a:lvl6pPr marL="2639827" indent="-239984" algn="l" defTabSz="959937" rtl="0" eaLnBrk="1" latinLnBrk="0" hangingPunct="1">
+      <a:lvl6pPr marL="4023360" indent="-365760" algn="l" defTabSz="1463040" rtl="0" eaLnBrk="1" latinLnBrk="0" hangingPunct="1">
         <a:lnSpc>
           <a:spcPct val="90000"/>
         </a:lnSpc>
         <a:spcBef>
-          <a:spcPts val="525"/>
+          <a:spcPts val="800"/>
         </a:spcBef>
         <a:buFont typeface="Arial" panose="020B0604020202020204" pitchFamily="34" charset="0"/>
         <a:buChar char="•"/>
-        <a:defRPr sz="1890" kern="1200">
+        <a:defRPr sz="2880" kern="1200">
           <a:solidFill>
             <a:schemeClr val="tx1"/>
           </a:solidFill>
@@ -2802,16 +2802,16 @@
           <a:cs typeface="+mn-cs"/>
         </a:defRPr>
       </a:lvl6pPr>
-      <a:lvl7pPr marL="3119796" indent="-239984" algn="l" defTabSz="959937" rtl="0" eaLnBrk="1" latinLnBrk="0" hangingPunct="1">
+      <a:lvl7pPr marL="4754880" indent="-365760" algn="l" defTabSz="1463040" rtl="0" eaLnBrk="1" latinLnBrk="0" hangingPunct="1">
         <a:lnSpc>
           <a:spcPct val="90000"/>
         </a:lnSpc>
         <a:spcBef>
-          <a:spcPts val="525"/>
+          <a:spcPts val="800"/>
         </a:spcBef>
         <a:buFont typeface="Arial" panose="020B0604020202020204" pitchFamily="34" charset="0"/>
         <a:buChar char="•"/>
-        <a:defRPr sz="1890" kern="1200">
+        <a:defRPr sz="2880" kern="1200">
           <a:solidFill>
             <a:schemeClr val="tx1"/>
           </a:solidFill>
@@ -2820,16 +2820,16 @@
           <a:cs typeface="+mn-cs"/>
         </a:defRPr>
       </a:lvl7pPr>
-      <a:lvl8pPr marL="3599764" indent="-239984" algn="l" defTabSz="959937" rtl="0" eaLnBrk="1" latinLnBrk="0" hangingPunct="1">
+      <a:lvl8pPr marL="5486400" indent="-365760" algn="l" defTabSz="1463040" rtl="0" eaLnBrk="1" latinLnBrk="0" hangingPunct="1">
         <a:lnSpc>
           <a:spcPct val="90000"/>
         </a:lnSpc>
         <a:spcBef>
-          <a:spcPts val="525"/>
+          <a:spcPts val="800"/>
         </a:spcBef>
         <a:buFont typeface="Arial" panose="020B0604020202020204" pitchFamily="34" charset="0"/>
         <a:buChar char="•"/>
-        <a:defRPr sz="1890" kern="1200">
+        <a:defRPr sz="2880" kern="1200">
           <a:solidFill>
             <a:schemeClr val="tx1"/>
           </a:solidFill>
@@ -2838,16 +2838,16 @@
           <a:cs typeface="+mn-cs"/>
         </a:defRPr>
       </a:lvl8pPr>
-      <a:lvl9pPr marL="4079733" indent="-239984" algn="l" defTabSz="959937" rtl="0" eaLnBrk="1" latinLnBrk="0" hangingPunct="1">
+      <a:lvl9pPr marL="6217920" indent="-365760" algn="l" defTabSz="1463040" rtl="0" eaLnBrk="1" latinLnBrk="0" hangingPunct="1">
         <a:lnSpc>
           <a:spcPct val="90000"/>
         </a:lnSpc>
         <a:spcBef>
-          <a:spcPts val="525"/>
+          <a:spcPts val="800"/>
         </a:spcBef>
         <a:buFont typeface="Arial" panose="020B0604020202020204" pitchFamily="34" charset="0"/>
         <a:buChar char="•"/>
-        <a:defRPr sz="1890" kern="1200">
+        <a:defRPr sz="2880" kern="1200">
           <a:solidFill>
             <a:schemeClr val="tx1"/>
           </a:solidFill>
@@ -2861,8 +2861,8 @@
       <a:defPPr>
         <a:defRPr lang="en-US"/>
       </a:defPPr>
-      <a:lvl1pPr marL="0" algn="l" defTabSz="959937" rtl="0" eaLnBrk="1" latinLnBrk="0" hangingPunct="1">
-        <a:defRPr sz="1890" kern="1200">
+      <a:lvl1pPr marL="0" algn="l" defTabSz="1463040" rtl="0" eaLnBrk="1" latinLnBrk="0" hangingPunct="1">
+        <a:defRPr sz="2880" kern="1200">
           <a:solidFill>
             <a:schemeClr val="tx1"/>
           </a:solidFill>
@@ -2871,8 +2871,8 @@
           <a:cs typeface="+mn-cs"/>
         </a:defRPr>
       </a:lvl1pPr>
-      <a:lvl2pPr marL="479969" algn="l" defTabSz="959937" rtl="0" eaLnBrk="1" latinLnBrk="0" hangingPunct="1">
-        <a:defRPr sz="1890" kern="1200">
+      <a:lvl2pPr marL="731520" algn="l" defTabSz="1463040" rtl="0" eaLnBrk="1" latinLnBrk="0" hangingPunct="1">
+        <a:defRPr sz="2880" kern="1200">
           <a:solidFill>
             <a:schemeClr val="tx1"/>
           </a:solidFill>
@@ -2881,8 +2881,8 @@
           <a:cs typeface="+mn-cs"/>
         </a:defRPr>
       </a:lvl2pPr>
-      <a:lvl3pPr marL="959937" algn="l" defTabSz="959937" rtl="0" eaLnBrk="1" latinLnBrk="0" hangingPunct="1">
-        <a:defRPr sz="1890" kern="1200">
+      <a:lvl3pPr marL="1463040" algn="l" defTabSz="1463040" rtl="0" eaLnBrk="1" latinLnBrk="0" hangingPunct="1">
+        <a:defRPr sz="2880" kern="1200">
           <a:solidFill>
             <a:schemeClr val="tx1"/>
           </a:solidFill>
@@ -2891,8 +2891,8 @@
           <a:cs typeface="+mn-cs"/>
         </a:defRPr>
       </a:lvl3pPr>
-      <a:lvl4pPr marL="1439906" algn="l" defTabSz="959937" rtl="0" eaLnBrk="1" latinLnBrk="0" hangingPunct="1">
-        <a:defRPr sz="1890" kern="1200">
+      <a:lvl4pPr marL="2194560" algn="l" defTabSz="1463040" rtl="0" eaLnBrk="1" latinLnBrk="0" hangingPunct="1">
+        <a:defRPr sz="2880" kern="1200">
           <a:solidFill>
             <a:schemeClr val="tx1"/>
           </a:solidFill>
@@ -2901,8 +2901,8 @@
           <a:cs typeface="+mn-cs"/>
         </a:defRPr>
       </a:lvl4pPr>
-      <a:lvl5pPr marL="1919874" algn="l" defTabSz="959937" rtl="0" eaLnBrk="1" latinLnBrk="0" hangingPunct="1">
-        <a:defRPr sz="1890" kern="1200">
+      <a:lvl5pPr marL="2926080" algn="l" defTabSz="1463040" rtl="0" eaLnBrk="1" latinLnBrk="0" hangingPunct="1">
+        <a:defRPr sz="2880" kern="1200">
           <a:solidFill>
             <a:schemeClr val="tx1"/>
           </a:solidFill>
@@ -2911,8 +2911,8 @@
           <a:cs typeface="+mn-cs"/>
         </a:defRPr>
       </a:lvl5pPr>
-      <a:lvl6pPr marL="2399843" algn="l" defTabSz="959937" rtl="0" eaLnBrk="1" latinLnBrk="0" hangingPunct="1">
-        <a:defRPr sz="1890" kern="1200">
+      <a:lvl6pPr marL="3657600" algn="l" defTabSz="1463040" rtl="0" eaLnBrk="1" latinLnBrk="0" hangingPunct="1">
+        <a:defRPr sz="2880" kern="1200">
           <a:solidFill>
             <a:schemeClr val="tx1"/>
           </a:solidFill>
@@ -2921,8 +2921,8 @@
           <a:cs typeface="+mn-cs"/>
         </a:defRPr>
       </a:lvl6pPr>
-      <a:lvl7pPr marL="2879811" algn="l" defTabSz="959937" rtl="0" eaLnBrk="1" latinLnBrk="0" hangingPunct="1">
-        <a:defRPr sz="1890" kern="1200">
+      <a:lvl7pPr marL="4389120" algn="l" defTabSz="1463040" rtl="0" eaLnBrk="1" latinLnBrk="0" hangingPunct="1">
+        <a:defRPr sz="2880" kern="1200">
           <a:solidFill>
             <a:schemeClr val="tx1"/>
           </a:solidFill>
@@ -2931,8 +2931,8 @@
           <a:cs typeface="+mn-cs"/>
         </a:defRPr>
       </a:lvl7pPr>
-      <a:lvl8pPr marL="3359780" algn="l" defTabSz="959937" rtl="0" eaLnBrk="1" latinLnBrk="0" hangingPunct="1">
-        <a:defRPr sz="1890" kern="1200">
+      <a:lvl8pPr marL="5120640" algn="l" defTabSz="1463040" rtl="0" eaLnBrk="1" latinLnBrk="0" hangingPunct="1">
+        <a:defRPr sz="2880" kern="1200">
           <a:solidFill>
             <a:schemeClr val="tx1"/>
           </a:solidFill>
@@ -2941,8 +2941,8 @@
           <a:cs typeface="+mn-cs"/>
         </a:defRPr>
       </a:lvl8pPr>
-      <a:lvl9pPr marL="3839748" algn="l" defTabSz="959937" rtl="0" eaLnBrk="1" latinLnBrk="0" hangingPunct="1">
-        <a:defRPr sz="1890" kern="1200">
+      <a:lvl9pPr marL="5852160" algn="l" defTabSz="1463040" rtl="0" eaLnBrk="1" latinLnBrk="0" hangingPunct="1">
+        <a:defRPr sz="2880" kern="1200">
           <a:solidFill>
             <a:schemeClr val="tx1"/>
           </a:solidFill>
@@ -2975,29 +2975,24 @@
       </p:grpSpPr>
       <p:sp>
         <p:nvSpPr>
-          <p:cNvPr id="361" name="Rounded Rectangle 360"/>
+          <p:cNvPr id="51" name="Rounded Rectangle 50"/>
           <p:cNvSpPr/>
           <p:nvPr/>
         </p:nvSpPr>
         <p:spPr>
           <a:xfrm>
-            <a:off x="7790425" y="379384"/>
-            <a:ext cx="1716804" cy="494578"/>
+            <a:off x="527664" y="457970"/>
+            <a:ext cx="2420471" cy="806824"/>
           </a:xfrm>
           <a:prstGeom prst="roundRect">
             <a:avLst/>
           </a:prstGeom>
-          <a:solidFill>
-            <a:schemeClr val="accent6">
-              <a:lumMod val="40000"/>
-              <a:lumOff val="60000"/>
-            </a:schemeClr>
-          </a:solidFill>
+          <a:noFill/>
           <a:ln w="31750">
             <a:solidFill>
-              <a:srgbClr val="666633">
+              <a:schemeClr val="tx1">
                 <a:alpha val="63000"/>
-              </a:srgbClr>
+              </a:schemeClr>
             </a:solidFill>
             <a:headEnd w="lg" len="lg"/>
             <a:tailEnd type="triangle"/>
@@ -3023,61 +3018,40 @@
           <a:p>
             <a:pPr algn="ctr"/>
             <a:r>
-              <a:rPr lang="en-US" sz="1312" dirty="0">
-                <a:solidFill>
-                  <a:srgbClr val="666633"/>
-                </a:solidFill>
-              </a:rPr>
-              <a:t>Method</a:t>
-            </a:r>
-            <a:r>
-              <a:rPr lang="en-US" sz="1312" dirty="0"/>
-              <a:t> </a:t>
+              <a:rPr lang="en-US" sz="2000" dirty="0"/>
+              <a:t>Method Declaration</a:t>
             </a:r>
           </a:p>
           <a:p>
             <a:pPr algn="ctr"/>
             <a:r>
-              <a:rPr lang="en-US" sz="1312" b="1" dirty="0" err="1">
-                <a:solidFill>
-                  <a:srgbClr val="666633"/>
-                </a:solidFill>
-              </a:rPr>
-              <a:t>actionPerformed</a:t>
-            </a:r>
-            <a:endParaRPr lang="en-US" sz="1312" b="1" dirty="0">
-              <a:solidFill>
-                <a:srgbClr val="666633"/>
-              </a:solidFill>
-            </a:endParaRPr>
-          </a:p>
-        </p:txBody>
-      </p:sp>
-      <p:sp>
-        <p:nvSpPr>
-          <p:cNvPr id="362" name="Rounded Rectangle 361"/>
+              <a:rPr lang="en-US" sz="2000" i="1" dirty="0" err="1"/>
+              <a:t>handleMessage</a:t>
+            </a:r>
+            <a:endParaRPr lang="en-US" sz="2000" i="1" dirty="0"/>
+          </a:p>
+        </p:txBody>
+      </p:sp>
+      <p:sp>
+        <p:nvSpPr>
+          <p:cNvPr id="52" name="Rounded Rectangle 51"/>
           <p:cNvSpPr/>
           <p:nvPr/>
         </p:nvSpPr>
         <p:spPr>
           <a:xfrm>
-            <a:off x="9235484" y="1051841"/>
-            <a:ext cx="1244378" cy="494578"/>
+            <a:off x="2564646" y="1554407"/>
+            <a:ext cx="2420471" cy="806824"/>
           </a:xfrm>
           <a:prstGeom prst="roundRect">
             <a:avLst/>
           </a:prstGeom>
-          <a:solidFill>
-            <a:schemeClr val="accent6">
-              <a:lumMod val="40000"/>
-              <a:lumOff val="60000"/>
-            </a:schemeClr>
-          </a:solidFill>
+          <a:noFill/>
           <a:ln w="31750">
             <a:solidFill>
-              <a:srgbClr val="666633">
+              <a:schemeClr val="tx1">
                 <a:alpha val="63000"/>
-              </a:srgbClr>
+              </a:schemeClr>
             </a:solidFill>
             <a:headEnd w="lg" len="lg"/>
             <a:tailEnd type="triangle"/>
@@ -3103,11 +3077,7 @@
           <a:p>
             <a:pPr algn="ctr"/>
             <a:r>
-              <a:rPr lang="en-US" sz="1312" dirty="0">
-                <a:solidFill>
-                  <a:srgbClr val="666633"/>
-                </a:solidFill>
-              </a:rPr>
+              <a:rPr lang="en-US" sz="2000" dirty="0"/>
               <a:t>Parameter</a:t>
             </a:r>
           </a:p>
@@ -3115,29 +3085,24 @@
       </p:sp>
       <p:sp>
         <p:nvSpPr>
-          <p:cNvPr id="363" name="Rounded Rectangle 362"/>
+          <p:cNvPr id="53" name="Rounded Rectangle 52"/>
           <p:cNvSpPr/>
           <p:nvPr/>
         </p:nvSpPr>
         <p:spPr>
           <a:xfrm>
-            <a:off x="10356390" y="2516260"/>
-            <a:ext cx="1738181" cy="494578"/>
+            <a:off x="2564645" y="2641143"/>
+            <a:ext cx="2420471" cy="806824"/>
           </a:xfrm>
           <a:prstGeom prst="roundRect">
             <a:avLst/>
           </a:prstGeom>
-          <a:solidFill>
-            <a:schemeClr val="accent6">
-              <a:lumMod val="40000"/>
-              <a:lumOff val="60000"/>
-            </a:schemeClr>
-          </a:solidFill>
+          <a:noFill/>
           <a:ln w="31750">
             <a:solidFill>
-              <a:srgbClr val="666633">
+              <a:schemeClr val="tx1">
                 <a:alpha val="63000"/>
-              </a:srgbClr>
+              </a:schemeClr>
             </a:solidFill>
             <a:headEnd w="lg" len="lg"/>
             <a:tailEnd type="triangle"/>
@@ -3163,41 +3128,32 @@
           <a:p>
             <a:pPr algn="ctr"/>
             <a:r>
-              <a:rPr lang="en-US" sz="1312" dirty="0">
-                <a:solidFill>
-                  <a:srgbClr val="666633"/>
-                </a:solidFill>
-              </a:rPr>
-              <a:t>Statement</a:t>
-            </a:r>
-          </a:p>
-        </p:txBody>
-      </p:sp>
-      <p:sp>
-        <p:nvSpPr>
-          <p:cNvPr id="364" name="Rounded Rectangle 363"/>
+              <a:rPr lang="en-US" sz="2000" dirty="0"/>
+              <a:t>Block</a:t>
+            </a:r>
+          </a:p>
+        </p:txBody>
+      </p:sp>
+      <p:sp>
+        <p:nvSpPr>
+          <p:cNvPr id="55" name="Rounded Rectangle 54"/>
           <p:cNvSpPr/>
           <p:nvPr/>
         </p:nvSpPr>
         <p:spPr>
           <a:xfrm>
-            <a:off x="11713752" y="3916948"/>
-            <a:ext cx="2029044" cy="494578"/>
+            <a:off x="4609520" y="7073916"/>
+            <a:ext cx="2420471" cy="806824"/>
           </a:xfrm>
           <a:prstGeom prst="roundRect">
             <a:avLst/>
           </a:prstGeom>
-          <a:solidFill>
-            <a:schemeClr val="accent6">
-              <a:lumMod val="40000"/>
-              <a:lumOff val="60000"/>
-            </a:schemeClr>
-          </a:solidFill>
+          <a:noFill/>
           <a:ln w="31750">
             <a:solidFill>
-              <a:srgbClr val="666633">
+              <a:schemeClr val="tx1">
                 <a:alpha val="63000"/>
-              </a:srgbClr>
+              </a:schemeClr>
             </a:solidFill>
             <a:headEnd w="lg" len="lg"/>
             <a:tailEnd type="triangle"/>
@@ -3222,39 +3178,41 @@
           <a:lstStyle/>
           <a:p>
             <a:pPr algn="ctr"/>
-            <a:r>
-              <a:rPr lang="en-US" sz="1312" dirty="0">
-                <a:solidFill>
-                  <a:srgbClr val="666633"/>
-                </a:solidFill>
-              </a:rPr>
-              <a:t>Expression</a:t>
-            </a:r>
-          </a:p>
-        </p:txBody>
-      </p:sp>
-      <p:sp>
-        <p:nvSpPr>
-          <p:cNvPr id="365" name="Rounded Rectangle 364"/>
+            <a:endParaRPr lang="en-US" sz="2000" dirty="0"/>
+          </a:p>
+          <a:p>
+            <a:pPr algn="ctr"/>
+            <a:r>
+              <a:rPr lang="en-US" sz="2000" dirty="0"/>
+              <a:t>Assignment </a:t>
+            </a:r>
+          </a:p>
+          <a:p>
+            <a:pPr algn="ctr"/>
+            <a:endParaRPr lang="en-US" sz="2000" dirty="0"/>
+          </a:p>
+        </p:txBody>
+      </p:sp>
+      <p:sp>
+        <p:nvSpPr>
+          <p:cNvPr id="56" name="Rounded Rectangle 55"/>
           <p:cNvSpPr/>
           <p:nvPr/>
         </p:nvSpPr>
         <p:spPr>
           <a:xfrm>
-            <a:off x="11713752" y="4580699"/>
-            <a:ext cx="2029044" cy="494578"/>
+            <a:off x="6679268" y="4827220"/>
+            <a:ext cx="2420471" cy="806824"/>
           </a:xfrm>
           <a:prstGeom prst="roundRect">
             <a:avLst/>
           </a:prstGeom>
-          <a:solidFill>
-            <a:srgbClr val="FFFF81"/>
-          </a:solidFill>
+          <a:noFill/>
           <a:ln w="31750">
             <a:solidFill>
-              <a:srgbClr val="666633">
+              <a:schemeClr val="tx1">
                 <a:alpha val="63000"/>
-              </a:srgbClr>
+              </a:schemeClr>
             </a:solidFill>
             <a:headEnd w="lg" len="lg"/>
             <a:tailEnd type="triangle"/>
@@ -3279,69 +3237,33 @@
           <a:lstStyle/>
           <a:p>
             <a:pPr algn="ctr"/>
-            <a:endParaRPr lang="en-US" sz="1312" dirty="0">
-              <a:solidFill>
-                <a:srgbClr val="666633"/>
-              </a:solidFill>
-            </a:endParaRPr>
-          </a:p>
-          <a:p>
-            <a:pPr algn="ctr"/>
-            <a:r>
-              <a:rPr lang="en-US" sz="1312" dirty="0">
-                <a:solidFill>
-                  <a:srgbClr val="666633"/>
-                </a:solidFill>
-              </a:rPr>
-              <a:t>Then Part</a:t>
-            </a:r>
-          </a:p>
-          <a:p>
-            <a:pPr algn="ctr"/>
-            <a:r>
-              <a:rPr lang="en-US" sz="1312" dirty="0">
-                <a:solidFill>
-                  <a:srgbClr val="666633"/>
-                </a:solidFill>
-              </a:rPr>
-              <a:t>Log Method Invocation</a:t>
-            </a:r>
-          </a:p>
-          <a:p>
-            <a:pPr algn="ctr"/>
-            <a:endParaRPr lang="en-US" sz="1312" dirty="0">
-              <a:solidFill>
-                <a:srgbClr val="666633"/>
-              </a:solidFill>
-            </a:endParaRPr>
-          </a:p>
-        </p:txBody>
-      </p:sp>
-      <p:sp>
-        <p:nvSpPr>
-          <p:cNvPr id="366" name="Rounded Rectangle 365"/>
+            <a:r>
+              <a:rPr lang="en-US" sz="2000" dirty="0"/>
+              <a:t>Expression</a:t>
+            </a:r>
+          </a:p>
+        </p:txBody>
+      </p:sp>
+      <p:sp>
+        <p:nvSpPr>
+          <p:cNvPr id="57" name="Rounded Rectangle 56"/>
           <p:cNvSpPr/>
           <p:nvPr/>
         </p:nvSpPr>
         <p:spPr>
           <a:xfrm>
-            <a:off x="11713752" y="5242677"/>
-            <a:ext cx="2029044" cy="494578"/>
+            <a:off x="4609520" y="3722045"/>
+            <a:ext cx="2420471" cy="806824"/>
           </a:xfrm>
           <a:prstGeom prst="roundRect">
             <a:avLst/>
           </a:prstGeom>
-          <a:solidFill>
-            <a:schemeClr val="accent6">
-              <a:lumMod val="40000"/>
-              <a:lumOff val="60000"/>
-            </a:schemeClr>
-          </a:solidFill>
+          <a:noFill/>
           <a:ln w="31750">
             <a:solidFill>
-              <a:srgbClr val="666633">
+              <a:schemeClr val="tx1">
                 <a:alpha val="63000"/>
-              </a:srgbClr>
+              </a:schemeClr>
             </a:solidFill>
             <a:headEnd w="lg" len="lg"/>
             <a:tailEnd type="triangle"/>
@@ -3366,129 +3288,26 @@
           <a:lstStyle/>
           <a:p>
             <a:pPr algn="ctr"/>
-            <a:endParaRPr lang="en-US" sz="1312" dirty="0">
-              <a:solidFill>
-                <a:srgbClr val="666633"/>
-              </a:solidFill>
-            </a:endParaRPr>
-          </a:p>
-          <a:p>
-            <a:pPr algn="ctr"/>
-            <a:r>
-              <a:rPr lang="en-US" sz="1312" dirty="0">
-                <a:solidFill>
-                  <a:srgbClr val="666633"/>
-                </a:solidFill>
-              </a:rPr>
-              <a:t>Else Part</a:t>
-            </a:r>
-          </a:p>
-          <a:p>
-            <a:pPr algn="ctr"/>
-            <a:r>
-              <a:rPr lang="en-US" sz="1312" dirty="0">
-                <a:solidFill>
-                  <a:srgbClr val="666633"/>
-                </a:solidFill>
-              </a:rPr>
-              <a:t>Statement </a:t>
-            </a:r>
-          </a:p>
-          <a:p>
-            <a:pPr algn="ctr"/>
-            <a:endParaRPr lang="en-US" sz="1312" dirty="0">
-              <a:solidFill>
-                <a:srgbClr val="666633"/>
-              </a:solidFill>
-            </a:endParaRPr>
-          </a:p>
-        </p:txBody>
-      </p:sp>
-      <p:sp>
-        <p:nvSpPr>
-          <p:cNvPr id="367" name="Rounded Rectangle 366"/>
-          <p:cNvSpPr/>
-          <p:nvPr/>
-        </p:nvSpPr>
-        <p:spPr>
-          <a:xfrm>
-            <a:off x="10356392" y="3210556"/>
-            <a:ext cx="1738179" cy="494578"/>
-          </a:xfrm>
-          <a:prstGeom prst="roundRect">
-            <a:avLst/>
-          </a:prstGeom>
-          <a:solidFill>
-            <a:schemeClr val="accent6">
-              <a:lumMod val="40000"/>
-              <a:lumOff val="60000"/>
-            </a:schemeClr>
-          </a:solidFill>
-          <a:ln w="31750">
-            <a:solidFill>
-              <a:srgbClr val="666633">
-                <a:alpha val="63000"/>
-              </a:srgbClr>
-            </a:solidFill>
-            <a:headEnd w="lg" len="lg"/>
-            <a:tailEnd type="triangle"/>
-          </a:ln>
-        </p:spPr>
-        <p:style>
-          <a:lnRef idx="1">
-            <a:schemeClr val="accent1"/>
-          </a:lnRef>
-          <a:fillRef idx="0">
-            <a:schemeClr val="accent1"/>
-          </a:fillRef>
-          <a:effectRef idx="0">
-            <a:schemeClr val="accent1"/>
-          </a:effectRef>
-          <a:fontRef idx="minor">
-            <a:schemeClr val="tx1"/>
-          </a:fontRef>
-        </p:style>
-        <p:txBody>
-          <a:bodyPr rtlCol="0" anchor="ctr"/>
-          <a:lstStyle/>
-          <a:p>
-            <a:pPr algn="ctr"/>
-            <a:r>
-              <a:rPr lang="en-US" sz="1312" dirty="0">
-                <a:solidFill>
-                  <a:srgbClr val="666633"/>
-                </a:solidFill>
-              </a:rPr>
-              <a:t>If</a:t>
-            </a:r>
-            <a:r>
-              <a:rPr lang="en-US" sz="1312" dirty="0"/>
-              <a:t> </a:t>
-            </a:r>
-            <a:r>
-              <a:rPr lang="en-US" sz="1312" dirty="0">
-                <a:solidFill>
-                  <a:srgbClr val="666633"/>
-                </a:solidFill>
-              </a:rPr>
-              <a:t>Statement</a:t>
+            <a:r>
+              <a:rPr lang="en-US" sz="2000" dirty="0"/>
+              <a:t>If Statement</a:t>
             </a:r>
           </a:p>
         </p:txBody>
       </p:sp>
       <p:cxnSp>
         <p:nvCxnSpPr>
-          <p:cNvPr id="2150" name="Elbow Connector 2149"/>
+          <p:cNvPr id="61" name="Elbow Connector 60"/>
           <p:cNvCxnSpPr>
-            <a:stCxn id="361" idx="2"/>
-            <a:endCxn id="362" idx="1"/>
+            <a:stCxn id="51" idx="2"/>
+            <a:endCxn id="52" idx="1"/>
           </p:cNvCxnSpPr>
           <p:nvPr/>
         </p:nvCxnSpPr>
         <p:spPr>
           <a:xfrm rot="16200000" flipH="1">
-            <a:off x="8729571" y="793217"/>
-            <a:ext cx="425168" cy="586657"/>
+            <a:off x="1804761" y="1197933"/>
+            <a:ext cx="693025" cy="826746"/>
           </a:xfrm>
           <a:prstGeom prst="bentConnector2">
             <a:avLst/>
@@ -3501,9 +3320,9 @@
           </a:solidFill>
           <a:ln w="31750">
             <a:solidFill>
-              <a:srgbClr val="666633">
+              <a:schemeClr val="tx1">
                 <a:alpha val="63000"/>
-              </a:srgbClr>
+              </a:schemeClr>
             </a:solidFill>
             <a:headEnd w="lg" len="lg"/>
             <a:tailEnd type="triangle"/>
@@ -3526,16 +3345,16 @@
       </p:cxnSp>
       <p:cxnSp>
         <p:nvCxnSpPr>
-          <p:cNvPr id="2157" name="Elbow Connector 2156"/>
+          <p:cNvPr id="62" name="Elbow Connector 61"/>
           <p:cNvCxnSpPr>
-            <a:endCxn id="367" idx="1"/>
+            <a:endCxn id="53" idx="1"/>
           </p:cNvCxnSpPr>
           <p:nvPr/>
         </p:nvCxnSpPr>
         <p:spPr>
           <a:xfrm rot="16200000" flipH="1">
-            <a:off x="9759883" y="2861336"/>
-            <a:ext cx="694297" cy="498720"/>
+            <a:off x="1607907" y="2087815"/>
+            <a:ext cx="1086735" cy="826746"/>
           </a:xfrm>
           <a:prstGeom prst="bentConnector2">
             <a:avLst/>
@@ -3548,9 +3367,9 @@
           </a:solidFill>
           <a:ln w="31750">
             <a:solidFill>
-              <a:srgbClr val="666633">
+              <a:schemeClr val="tx1">
                 <a:alpha val="63000"/>
-              </a:srgbClr>
+              </a:schemeClr>
             </a:solidFill>
             <a:headEnd w="lg" len="lg"/>
             <a:tailEnd type="triangle"/>
@@ -3573,17 +3392,16 @@
       </p:cxnSp>
       <p:cxnSp>
         <p:nvCxnSpPr>
-          <p:cNvPr id="2161" name="Elbow Connector 2160"/>
+          <p:cNvPr id="64" name="Elbow Connector 63"/>
           <p:cNvCxnSpPr>
-            <a:stCxn id="367" idx="2"/>
-            <a:endCxn id="364" idx="1"/>
+            <a:endCxn id="55" idx="1"/>
           </p:cNvCxnSpPr>
           <p:nvPr/>
         </p:nvCxnSpPr>
         <p:spPr>
           <a:xfrm rot="16200000" flipH="1">
-            <a:off x="11240066" y="3690549"/>
-            <a:ext cx="459103" cy="488270"/>
+            <a:off x="2516263" y="5384070"/>
+            <a:ext cx="3351871" cy="834644"/>
           </a:xfrm>
           <a:prstGeom prst="bentConnector2">
             <a:avLst/>
@@ -3596,588 +3414,9 @@
           </a:solidFill>
           <a:ln w="31750">
             <a:solidFill>
-              <a:srgbClr val="666633">
+              <a:schemeClr val="tx1">
                 <a:alpha val="63000"/>
-              </a:srgbClr>
-            </a:solidFill>
-            <a:headEnd w="lg" len="lg"/>
-            <a:tailEnd type="triangle"/>
-          </a:ln>
-        </p:spPr>
-        <p:style>
-          <a:lnRef idx="1">
-            <a:schemeClr val="accent1"/>
-          </a:lnRef>
-          <a:fillRef idx="0">
-            <a:schemeClr val="accent1"/>
-          </a:fillRef>
-          <a:effectRef idx="0">
-            <a:schemeClr val="accent1"/>
-          </a:effectRef>
-          <a:fontRef idx="minor">
-            <a:schemeClr val="tx1"/>
-          </a:fontRef>
-        </p:style>
-      </p:cxnSp>
-      <p:cxnSp>
-        <p:nvCxnSpPr>
-          <p:cNvPr id="2164" name="Elbow Connector 2163"/>
-          <p:cNvCxnSpPr>
-            <a:endCxn id="365" idx="1"/>
-          </p:cNvCxnSpPr>
-          <p:nvPr/>
-        </p:nvCxnSpPr>
-        <p:spPr>
-          <a:xfrm rot="16200000" flipH="1">
-            <a:off x="11137739" y="4251976"/>
-            <a:ext cx="663752" cy="488272"/>
-          </a:xfrm>
-          <a:prstGeom prst="bentConnector2">
-            <a:avLst/>
-          </a:prstGeom>
-          <a:solidFill>
-            <a:schemeClr val="accent6">
-              <a:lumMod val="40000"/>
-              <a:lumOff val="60000"/>
-            </a:schemeClr>
-          </a:solidFill>
-          <a:ln w="31750">
-            <a:solidFill>
-              <a:srgbClr val="666633">
-                <a:alpha val="63000"/>
-              </a:srgbClr>
-            </a:solidFill>
-            <a:headEnd w="lg" len="lg"/>
-            <a:tailEnd type="triangle"/>
-          </a:ln>
-        </p:spPr>
-        <p:style>
-          <a:lnRef idx="1">
-            <a:schemeClr val="accent1"/>
-          </a:lnRef>
-          <a:fillRef idx="0">
-            <a:schemeClr val="accent1"/>
-          </a:fillRef>
-          <a:effectRef idx="0">
-            <a:schemeClr val="accent1"/>
-          </a:effectRef>
-          <a:fontRef idx="minor">
-            <a:schemeClr val="tx1"/>
-          </a:fontRef>
-        </p:style>
-      </p:cxnSp>
-      <p:sp>
-        <p:nvSpPr>
-          <p:cNvPr id="51" name="Rounded Rectangle 50"/>
-          <p:cNvSpPr/>
-          <p:nvPr/>
-        </p:nvSpPr>
-        <p:spPr>
-          <a:xfrm>
-            <a:off x="650645" y="379384"/>
-            <a:ext cx="1557900" cy="494578"/>
-          </a:xfrm>
-          <a:prstGeom prst="roundRect">
-            <a:avLst/>
-          </a:prstGeom>
-          <a:solidFill>
-            <a:schemeClr val="accent6">
-              <a:lumMod val="40000"/>
-              <a:lumOff val="60000"/>
-            </a:schemeClr>
-          </a:solidFill>
-          <a:ln w="31750">
-            <a:solidFill>
-              <a:srgbClr val="666633">
-                <a:alpha val="63000"/>
-              </a:srgbClr>
-            </a:solidFill>
-            <a:headEnd w="lg" len="lg"/>
-            <a:tailEnd type="triangle"/>
-          </a:ln>
-        </p:spPr>
-        <p:style>
-          <a:lnRef idx="1">
-            <a:schemeClr val="accent1"/>
-          </a:lnRef>
-          <a:fillRef idx="0">
-            <a:schemeClr val="accent1"/>
-          </a:fillRef>
-          <a:effectRef idx="0">
-            <a:schemeClr val="accent1"/>
-          </a:effectRef>
-          <a:fontRef idx="minor">
-            <a:schemeClr val="tx1"/>
-          </a:fontRef>
-        </p:style>
-        <p:txBody>
-          <a:bodyPr rtlCol="0" anchor="ctr"/>
-          <a:lstStyle/>
-          <a:p>
-            <a:pPr algn="ctr"/>
-            <a:r>
-              <a:rPr lang="en-US" sz="1312" dirty="0">
-                <a:solidFill>
-                  <a:srgbClr val="666633"/>
-                </a:solidFill>
-              </a:rPr>
-              <a:t>Method</a:t>
-            </a:r>
-          </a:p>
-          <a:p>
-            <a:pPr algn="ctr"/>
-            <a:r>
-              <a:rPr lang="en-US" sz="1312" b="1" dirty="0" err="1">
-                <a:solidFill>
-                  <a:srgbClr val="666633"/>
-                </a:solidFill>
-              </a:rPr>
-              <a:t>handleMessage</a:t>
-            </a:r>
-            <a:endParaRPr lang="en-US" sz="1312" b="1" dirty="0">
-              <a:solidFill>
-                <a:srgbClr val="666633"/>
-              </a:solidFill>
-            </a:endParaRPr>
-          </a:p>
-        </p:txBody>
-      </p:sp>
-      <p:sp>
-        <p:nvSpPr>
-          <p:cNvPr id="52" name="Rounded Rectangle 51"/>
-          <p:cNvSpPr/>
-          <p:nvPr/>
-        </p:nvSpPr>
-        <p:spPr>
-          <a:xfrm>
-            <a:off x="2085438" y="1157190"/>
-            <a:ext cx="1156480" cy="494578"/>
-          </a:xfrm>
-          <a:prstGeom prst="roundRect">
-            <a:avLst/>
-          </a:prstGeom>
-          <a:solidFill>
-            <a:schemeClr val="accent6">
-              <a:lumMod val="40000"/>
-              <a:lumOff val="60000"/>
-            </a:schemeClr>
-          </a:solidFill>
-          <a:ln w="31750">
-            <a:solidFill>
-              <a:srgbClr val="666633">
-                <a:alpha val="63000"/>
-              </a:srgbClr>
-            </a:solidFill>
-            <a:headEnd w="lg" len="lg"/>
-            <a:tailEnd type="triangle"/>
-          </a:ln>
-        </p:spPr>
-        <p:style>
-          <a:lnRef idx="1">
-            <a:schemeClr val="accent1"/>
-          </a:lnRef>
-          <a:fillRef idx="0">
-            <a:schemeClr val="accent1"/>
-          </a:fillRef>
-          <a:effectRef idx="0">
-            <a:schemeClr val="accent1"/>
-          </a:effectRef>
-          <a:fontRef idx="minor">
-            <a:schemeClr val="tx1"/>
-          </a:fontRef>
-        </p:style>
-        <p:txBody>
-          <a:bodyPr rtlCol="0" anchor="ctr"/>
-          <a:lstStyle/>
-          <a:p>
-            <a:pPr algn="ctr"/>
-            <a:r>
-              <a:rPr lang="en-US" sz="1312" dirty="0">
-                <a:solidFill>
-                  <a:srgbClr val="666633"/>
-                </a:solidFill>
-              </a:rPr>
-              <a:t>Parameter</a:t>
-            </a:r>
-          </a:p>
-        </p:txBody>
-      </p:sp>
-      <p:sp>
-        <p:nvSpPr>
-          <p:cNvPr id="53" name="Rounded Rectangle 52"/>
-          <p:cNvSpPr/>
-          <p:nvPr/>
-        </p:nvSpPr>
-        <p:spPr>
-          <a:xfrm>
-            <a:off x="2075930" y="1814130"/>
-            <a:ext cx="1165987" cy="494578"/>
-          </a:xfrm>
-          <a:prstGeom prst="roundRect">
-            <a:avLst/>
-          </a:prstGeom>
-          <a:solidFill>
-            <a:schemeClr val="accent6">
-              <a:lumMod val="40000"/>
-              <a:lumOff val="60000"/>
-            </a:schemeClr>
-          </a:solidFill>
-          <a:ln w="31750">
-            <a:solidFill>
-              <a:srgbClr val="666633">
-                <a:alpha val="63000"/>
-              </a:srgbClr>
-            </a:solidFill>
-            <a:headEnd w="lg" len="lg"/>
-            <a:tailEnd type="triangle"/>
-          </a:ln>
-        </p:spPr>
-        <p:style>
-          <a:lnRef idx="1">
-            <a:schemeClr val="accent1"/>
-          </a:lnRef>
-          <a:fillRef idx="0">
-            <a:schemeClr val="accent1"/>
-          </a:fillRef>
-          <a:effectRef idx="0">
-            <a:schemeClr val="accent1"/>
-          </a:effectRef>
-          <a:fontRef idx="minor">
-            <a:schemeClr val="tx1"/>
-          </a:fontRef>
-        </p:style>
-        <p:txBody>
-          <a:bodyPr rtlCol="0" anchor="ctr"/>
-          <a:lstStyle/>
-          <a:p>
-            <a:pPr algn="ctr"/>
-            <a:r>
-              <a:rPr lang="en-US" sz="1312" dirty="0">
-                <a:solidFill>
-                  <a:srgbClr val="666633"/>
-                </a:solidFill>
-              </a:rPr>
-              <a:t>Block</a:t>
-            </a:r>
-          </a:p>
-        </p:txBody>
-      </p:sp>
-      <p:sp>
-        <p:nvSpPr>
-          <p:cNvPr id="55" name="Rounded Rectangle 54"/>
-          <p:cNvSpPr/>
-          <p:nvPr/>
-        </p:nvSpPr>
-        <p:spPr>
-          <a:xfrm>
-            <a:off x="3178263" y="4481673"/>
-            <a:ext cx="1582281" cy="494578"/>
-          </a:xfrm>
-          <a:prstGeom prst="roundRect">
-            <a:avLst/>
-          </a:prstGeom>
-          <a:solidFill>
-            <a:schemeClr val="accent6">
-              <a:lumMod val="40000"/>
-              <a:lumOff val="60000"/>
-            </a:schemeClr>
-          </a:solidFill>
-          <a:ln w="31750">
-            <a:solidFill>
-              <a:srgbClr val="666633">
-                <a:alpha val="63000"/>
-              </a:srgbClr>
-            </a:solidFill>
-            <a:headEnd w="lg" len="lg"/>
-            <a:tailEnd type="triangle"/>
-          </a:ln>
-        </p:spPr>
-        <p:style>
-          <a:lnRef idx="1">
-            <a:schemeClr val="accent1"/>
-          </a:lnRef>
-          <a:fillRef idx="0">
-            <a:schemeClr val="accent1"/>
-          </a:fillRef>
-          <a:effectRef idx="0">
-            <a:schemeClr val="accent1"/>
-          </a:effectRef>
-          <a:fontRef idx="minor">
-            <a:schemeClr val="tx1"/>
-          </a:fontRef>
-        </p:style>
-        <p:txBody>
-          <a:bodyPr rtlCol="0" anchor="ctr"/>
-          <a:lstStyle/>
-          <a:p>
-            <a:pPr algn="ctr"/>
-            <a:endParaRPr lang="en-US" sz="1312" dirty="0">
-              <a:solidFill>
-                <a:srgbClr val="666633"/>
-              </a:solidFill>
-            </a:endParaRPr>
-          </a:p>
-          <a:p>
-            <a:pPr algn="ctr"/>
-            <a:r>
-              <a:rPr lang="en-US" sz="1312" dirty="0">
-                <a:solidFill>
-                  <a:srgbClr val="666633"/>
-                </a:solidFill>
-              </a:rPr>
-              <a:t>Statement </a:t>
-            </a:r>
-          </a:p>
-          <a:p>
-            <a:pPr algn="ctr"/>
-            <a:endParaRPr lang="en-US" sz="1312" dirty="0">
-              <a:solidFill>
-                <a:srgbClr val="666633"/>
-              </a:solidFill>
-            </a:endParaRPr>
-          </a:p>
-        </p:txBody>
-      </p:sp>
-      <p:sp>
-        <p:nvSpPr>
-          <p:cNvPr id="56" name="Rounded Rectangle 55"/>
-          <p:cNvSpPr/>
-          <p:nvPr/>
-        </p:nvSpPr>
-        <p:spPr>
-          <a:xfrm>
-            <a:off x="4352756" y="3208489"/>
-            <a:ext cx="1201827" cy="494578"/>
-          </a:xfrm>
-          <a:prstGeom prst="roundRect">
-            <a:avLst/>
-          </a:prstGeom>
-          <a:solidFill>
-            <a:schemeClr val="accent6">
-              <a:lumMod val="40000"/>
-              <a:lumOff val="60000"/>
-            </a:schemeClr>
-          </a:solidFill>
-          <a:ln w="31750">
-            <a:solidFill>
-              <a:srgbClr val="666633">
-                <a:alpha val="63000"/>
-              </a:srgbClr>
-            </a:solidFill>
-            <a:headEnd w="lg" len="lg"/>
-            <a:tailEnd type="triangle"/>
-          </a:ln>
-        </p:spPr>
-        <p:style>
-          <a:lnRef idx="1">
-            <a:schemeClr val="accent1"/>
-          </a:lnRef>
-          <a:fillRef idx="0">
-            <a:schemeClr val="accent1"/>
-          </a:fillRef>
-          <a:effectRef idx="0">
-            <a:schemeClr val="accent1"/>
-          </a:effectRef>
-          <a:fontRef idx="minor">
-            <a:schemeClr val="tx1"/>
-          </a:fontRef>
-        </p:style>
-        <p:txBody>
-          <a:bodyPr rtlCol="0" anchor="ctr"/>
-          <a:lstStyle/>
-          <a:p>
-            <a:pPr algn="ctr"/>
-            <a:r>
-              <a:rPr lang="en-US" sz="1312" dirty="0">
-                <a:solidFill>
-                  <a:srgbClr val="666633"/>
-                </a:solidFill>
-              </a:rPr>
-              <a:t>Expression</a:t>
-            </a:r>
-          </a:p>
-        </p:txBody>
-      </p:sp>
-      <p:sp>
-        <p:nvSpPr>
-          <p:cNvPr id="57" name="Rounded Rectangle 56"/>
-          <p:cNvSpPr/>
-          <p:nvPr/>
-        </p:nvSpPr>
-        <p:spPr>
-          <a:xfrm>
-            <a:off x="3173501" y="2593830"/>
-            <a:ext cx="1557154" cy="494577"/>
-          </a:xfrm>
-          <a:prstGeom prst="roundRect">
-            <a:avLst/>
-          </a:prstGeom>
-          <a:solidFill>
-            <a:schemeClr val="accent6">
-              <a:lumMod val="40000"/>
-              <a:lumOff val="60000"/>
-            </a:schemeClr>
-          </a:solidFill>
-          <a:ln w="31750">
-            <a:solidFill>
-              <a:srgbClr val="666633">
-                <a:alpha val="63000"/>
-              </a:srgbClr>
-            </a:solidFill>
-            <a:headEnd w="lg" len="lg"/>
-            <a:tailEnd type="triangle"/>
-          </a:ln>
-        </p:spPr>
-        <p:style>
-          <a:lnRef idx="1">
-            <a:schemeClr val="accent1"/>
-          </a:lnRef>
-          <a:fillRef idx="0">
-            <a:schemeClr val="accent1"/>
-          </a:fillRef>
-          <a:effectRef idx="0">
-            <a:schemeClr val="accent1"/>
-          </a:effectRef>
-          <a:fontRef idx="minor">
-            <a:schemeClr val="tx1"/>
-          </a:fontRef>
-        </p:style>
-        <p:txBody>
-          <a:bodyPr rtlCol="0" anchor="ctr"/>
-          <a:lstStyle/>
-          <a:p>
-            <a:pPr algn="ctr"/>
-            <a:r>
-              <a:rPr lang="en-US" sz="1312" dirty="0">
-                <a:solidFill>
-                  <a:srgbClr val="666633"/>
-                </a:solidFill>
-              </a:rPr>
-              <a:t>If Statement</a:t>
-            </a:r>
-          </a:p>
-        </p:txBody>
-      </p:sp>
-      <p:cxnSp>
-        <p:nvCxnSpPr>
-          <p:cNvPr id="61" name="Elbow Connector 60"/>
-          <p:cNvCxnSpPr>
-            <a:stCxn id="51" idx="2"/>
-            <a:endCxn id="52" idx="1"/>
-          </p:cNvCxnSpPr>
-          <p:nvPr/>
-        </p:nvCxnSpPr>
-        <p:spPr>
-          <a:xfrm rot="16200000" flipH="1">
-            <a:off x="1492258" y="811298"/>
-            <a:ext cx="530517" cy="655843"/>
-          </a:xfrm>
-          <a:prstGeom prst="bentConnector2">
-            <a:avLst/>
-          </a:prstGeom>
-          <a:solidFill>
-            <a:schemeClr val="accent6">
-              <a:lumMod val="40000"/>
-              <a:lumOff val="60000"/>
-            </a:schemeClr>
-          </a:solidFill>
-          <a:ln w="31750">
-            <a:solidFill>
-              <a:srgbClr val="666633">
-                <a:alpha val="63000"/>
-              </a:srgbClr>
-            </a:solidFill>
-            <a:headEnd w="lg" len="lg"/>
-            <a:tailEnd type="triangle"/>
-          </a:ln>
-        </p:spPr>
-        <p:style>
-          <a:lnRef idx="1">
-            <a:schemeClr val="accent1"/>
-          </a:lnRef>
-          <a:fillRef idx="0">
-            <a:schemeClr val="accent1"/>
-          </a:fillRef>
-          <a:effectRef idx="0">
-            <a:schemeClr val="accent1"/>
-          </a:effectRef>
-          <a:fontRef idx="minor">
-            <a:schemeClr val="tx1"/>
-          </a:fontRef>
-        </p:style>
-      </p:cxnSp>
-      <p:cxnSp>
-        <p:nvCxnSpPr>
-          <p:cNvPr id="62" name="Elbow Connector 61"/>
-          <p:cNvCxnSpPr>
-            <a:endCxn id="53" idx="1"/>
-          </p:cNvCxnSpPr>
-          <p:nvPr/>
-        </p:nvCxnSpPr>
-        <p:spPr>
-          <a:xfrm rot="16200000" flipH="1">
-            <a:off x="1422196" y="1407684"/>
-            <a:ext cx="655044" cy="652424"/>
-          </a:xfrm>
-          <a:prstGeom prst="bentConnector2">
-            <a:avLst/>
-          </a:prstGeom>
-          <a:solidFill>
-            <a:schemeClr val="accent6">
-              <a:lumMod val="40000"/>
-              <a:lumOff val="60000"/>
-            </a:schemeClr>
-          </a:solidFill>
-          <a:ln w="31750">
-            <a:solidFill>
-              <a:srgbClr val="666633">
-                <a:alpha val="63000"/>
-              </a:srgbClr>
-            </a:solidFill>
-            <a:headEnd w="lg" len="lg"/>
-            <a:tailEnd type="triangle"/>
-          </a:ln>
-        </p:spPr>
-        <p:style>
-          <a:lnRef idx="1">
-            <a:schemeClr val="accent1"/>
-          </a:lnRef>
-          <a:fillRef idx="0">
-            <a:schemeClr val="accent1"/>
-          </a:fillRef>
-          <a:effectRef idx="0">
-            <a:schemeClr val="accent1"/>
-          </a:effectRef>
-          <a:fontRef idx="minor">
-            <a:schemeClr val="tx1"/>
-          </a:fontRef>
-        </p:style>
-      </p:cxnSp>
-      <p:cxnSp>
-        <p:nvCxnSpPr>
-          <p:cNvPr id="64" name="Elbow Connector 63"/>
-          <p:cNvCxnSpPr/>
-          <p:nvPr/>
-        </p:nvCxnSpPr>
-        <p:spPr>
-          <a:xfrm rot="16200000" flipH="1">
-            <a:off x="1968602" y="3528148"/>
-            <a:ext cx="1887841" cy="513788"/>
-          </a:xfrm>
-          <a:prstGeom prst="bentConnector2">
-            <a:avLst/>
-          </a:prstGeom>
-          <a:solidFill>
-            <a:schemeClr val="accent6">
-              <a:lumMod val="40000"/>
-              <a:lumOff val="60000"/>
-            </a:schemeClr>
-          </a:solidFill>
-          <a:ln w="31750">
-            <a:solidFill>
-              <a:srgbClr val="666633">
-                <a:alpha val="63000"/>
-              </a:srgbClr>
+              </a:schemeClr>
             </a:solidFill>
             <a:headEnd w="lg" len="lg"/>
             <a:tailEnd type="triangle"/>
@@ -4209,8 +3448,8 @@
         </p:nvCxnSpPr>
         <p:spPr>
           <a:xfrm rot="16200000" flipH="1">
-            <a:off x="3968732" y="3071753"/>
-            <a:ext cx="367370" cy="400676"/>
+            <a:off x="5898627" y="4449993"/>
+            <a:ext cx="701765" cy="859512"/>
           </a:xfrm>
           <a:prstGeom prst="bentConnector2">
             <a:avLst/>
@@ -4223,9 +3462,9 @@
           </a:solidFill>
           <a:ln w="31750">
             <a:solidFill>
-              <a:srgbClr val="666633">
+              <a:schemeClr val="tx1">
                 <a:alpha val="63000"/>
-              </a:srgbClr>
+              </a:schemeClr>
             </a:solidFill>
             <a:headEnd w="lg" len="lg"/>
             <a:tailEnd type="triangle"/>
@@ -4256,8 +3495,8 @@
         </p:nvCxnSpPr>
         <p:spPr>
           <a:xfrm rot="16200000" flipH="1">
-            <a:off x="3851029" y="3574039"/>
-            <a:ext cx="614812" cy="402130"/>
+            <a:off x="5684963" y="5365421"/>
+            <a:ext cx="1141521" cy="871941"/>
           </a:xfrm>
           <a:prstGeom prst="bentConnector2">
             <a:avLst/>
@@ -4270,9 +3509,9 @@
           </a:solidFill>
           <a:ln w="31750">
             <a:solidFill>
-              <a:srgbClr val="666633">
+              <a:schemeClr val="tx1">
                 <a:alpha val="63000"/>
-              </a:srgbClr>
+              </a:schemeClr>
             </a:solidFill>
             <a:headEnd w="lg" len="lg"/>
             <a:tailEnd type="triangle"/>
@@ -4301,23 +3540,18 @@
         </p:nvSpPr>
         <p:spPr>
           <a:xfrm>
-            <a:off x="4359501" y="3835221"/>
-            <a:ext cx="1718862" cy="494578"/>
+            <a:off x="6691694" y="5968741"/>
+            <a:ext cx="2420471" cy="806824"/>
           </a:xfrm>
           <a:prstGeom prst="roundRect">
             <a:avLst/>
           </a:prstGeom>
-          <a:solidFill>
-            <a:schemeClr val="accent6">
-              <a:lumMod val="40000"/>
-              <a:lumOff val="60000"/>
-            </a:schemeClr>
-          </a:solidFill>
+          <a:noFill/>
           <a:ln w="31750">
             <a:solidFill>
-              <a:srgbClr val="666633">
+              <a:schemeClr val="tx1">
                 <a:alpha val="63000"/>
-              </a:srgbClr>
+              </a:schemeClr>
             </a:solidFill>
             <a:headEnd w="lg" len="lg"/>
             <a:tailEnd type="triangle"/>
@@ -4343,24 +3577,15 @@
           <a:p>
             <a:pPr algn="ctr"/>
             <a:r>
-              <a:rPr lang="en-US" sz="1312" dirty="0">
-                <a:solidFill>
-                  <a:srgbClr val="666633"/>
-                </a:solidFill>
-              </a:rPr>
-              <a:t>Return</a:t>
-            </a:r>
-            <a:r>
-              <a:rPr lang="en-US" sz="1312" dirty="0"/>
-              <a:t> </a:t>
-            </a:r>
-            <a:r>
-              <a:rPr lang="en-US" sz="1312" dirty="0">
-                <a:solidFill>
-                  <a:srgbClr val="666633"/>
-                </a:solidFill>
-              </a:rPr>
-              <a:t>Statement</a:t>
+              <a:rPr lang="en-US" sz="2000" dirty="0"/>
+              <a:t>Then Part</a:t>
+            </a:r>
+          </a:p>
+          <a:p>
+            <a:pPr algn="ctr"/>
+            <a:r>
+              <a:rPr lang="en-US" sz="2000" dirty="0"/>
+              <a:t>Return Statement</a:t>
             </a:r>
           </a:p>
         </p:txBody>
@@ -4373,20 +3598,18 @@
         </p:nvSpPr>
         <p:spPr>
           <a:xfrm>
-            <a:off x="3173504" y="5093493"/>
-            <a:ext cx="1921105" cy="494578"/>
+            <a:off x="4609520" y="8179091"/>
+            <a:ext cx="2420471" cy="806824"/>
           </a:xfrm>
           <a:prstGeom prst="roundRect">
             <a:avLst/>
           </a:prstGeom>
-          <a:solidFill>
-            <a:srgbClr val="FFFF81"/>
-          </a:solidFill>
+          <a:noFill/>
           <a:ln w="31750">
             <a:solidFill>
-              <a:srgbClr val="666633">
+              <a:schemeClr val="tx1">
                 <a:alpha val="63000"/>
-              </a:srgbClr>
+              </a:schemeClr>
             </a:solidFill>
             <a:headEnd w="lg" len="lg"/>
             <a:tailEnd type="triangle"/>
@@ -4411,43 +3634,37 @@
           <a:lstStyle/>
           <a:p>
             <a:pPr algn="ctr"/>
-            <a:endParaRPr lang="en-US" sz="1312" dirty="0">
-              <a:solidFill>
-                <a:srgbClr val="666633"/>
-              </a:solidFill>
-            </a:endParaRPr>
+            <a:endParaRPr lang="en-US" sz="2000" dirty="0"/>
           </a:p>
           <a:p>
             <a:pPr algn="ctr"/>
             <a:r>
-              <a:rPr lang="en-US" sz="1312" dirty="0">
+              <a:rPr lang="en-US" sz="2000" dirty="0">
                 <a:solidFill>
-                  <a:srgbClr val="666633"/>
+                  <a:srgbClr val="C00000"/>
                 </a:solidFill>
               </a:rPr>
-              <a:t>Log Method Invocation </a:t>
+              <a:t>Log Statement </a:t>
             </a:r>
           </a:p>
           <a:p>
             <a:pPr algn="ctr"/>
-            <a:endParaRPr lang="en-US" sz="1312" dirty="0">
-              <a:solidFill>
-                <a:srgbClr val="666633"/>
-              </a:solidFill>
-            </a:endParaRPr>
+            <a:endParaRPr lang="en-US" sz="2000" dirty="0"/>
           </a:p>
         </p:txBody>
       </p:sp>
       <p:cxnSp>
         <p:nvCxnSpPr>
           <p:cNvPr id="70" name="Elbow Connector 69"/>
-          <p:cNvCxnSpPr/>
+          <p:cNvCxnSpPr>
+            <a:endCxn id="69" idx="1"/>
+          </p:cNvCxnSpPr>
           <p:nvPr/>
         </p:nvCxnSpPr>
         <p:spPr>
           <a:xfrm rot="16200000" flipH="1">
-            <a:off x="2613873" y="4777582"/>
-            <a:ext cx="611820" cy="514580"/>
+            <a:off x="3639613" y="7612603"/>
+            <a:ext cx="1105175" cy="834641"/>
           </a:xfrm>
           <a:prstGeom prst="bentConnector2">
             <a:avLst/>
@@ -4460,9 +3677,9 @@
           </a:solidFill>
           <a:ln w="31750">
             <a:solidFill>
-              <a:srgbClr val="666633">
+              <a:schemeClr val="tx1">
                 <a:alpha val="63000"/>
-              </a:srgbClr>
+              </a:schemeClr>
             </a:solidFill>
             <a:headEnd w="lg" len="lg"/>
             <a:tailEnd type="triangle"/>
@@ -4494,8 +3711,8 @@
         </p:nvCxnSpPr>
         <p:spPr>
           <a:xfrm rot="16200000" flipH="1">
-            <a:off x="2650006" y="2317624"/>
-            <a:ext cx="532412" cy="514579"/>
+            <a:off x="3853448" y="3369393"/>
+            <a:ext cx="677490" cy="834640"/>
           </a:xfrm>
           <a:prstGeom prst="bentConnector2">
             <a:avLst/>
@@ -4508,9 +3725,9 @@
           </a:solidFill>
           <a:ln w="31750">
             <a:solidFill>
-              <a:srgbClr val="666633">
+              <a:schemeClr val="tx1">
                 <a:alpha val="63000"/>
-              </a:srgbClr>
+              </a:schemeClr>
             </a:solidFill>
             <a:headEnd w="lg" len="lg"/>
             <a:tailEnd type="triangle"/>
@@ -4531,19 +3748,70 @@
           </a:fontRef>
         </p:style>
       </p:cxnSp>
+      <p:sp>
+        <p:nvSpPr>
+          <p:cNvPr id="73" name="Rounded Rectangle 72"/>
+          <p:cNvSpPr/>
+          <p:nvPr/>
+        </p:nvSpPr>
+        <p:spPr>
+          <a:xfrm>
+            <a:off x="17209027" y="6144654"/>
+            <a:ext cx="2420471" cy="806824"/>
+          </a:xfrm>
+          <a:prstGeom prst="roundRect">
+            <a:avLst/>
+          </a:prstGeom>
+          <a:noFill/>
+          <a:ln w="31750">
+            <a:solidFill>
+              <a:schemeClr val="tx1">
+                <a:alpha val="63000"/>
+              </a:schemeClr>
+            </a:solidFill>
+            <a:headEnd w="lg" len="lg"/>
+            <a:tailEnd type="triangle"/>
+          </a:ln>
+        </p:spPr>
+        <p:style>
+          <a:lnRef idx="1">
+            <a:schemeClr val="accent1"/>
+          </a:lnRef>
+          <a:fillRef idx="0">
+            <a:schemeClr val="accent1"/>
+          </a:fillRef>
+          <a:effectRef idx="0">
+            <a:schemeClr val="accent1"/>
+          </a:effectRef>
+          <a:fontRef idx="minor">
+            <a:schemeClr val="tx1"/>
+          </a:fontRef>
+        </p:style>
+        <p:txBody>
+          <a:bodyPr rtlCol="0" anchor="ctr"/>
+          <a:lstStyle/>
+          <a:p>
+            <a:pPr algn="ctr"/>
+            <a:r>
+              <a:rPr lang="en-US" sz="2000" dirty="0"/>
+              <a:t>Expression</a:t>
+            </a:r>
+          </a:p>
+        </p:txBody>
+      </p:sp>
       <p:cxnSp>
         <p:nvCxnSpPr>
-          <p:cNvPr id="2162" name="Elbow Connector 2161"/>
+          <p:cNvPr id="79" name="Elbow Connector 78"/>
           <p:cNvCxnSpPr>
-            <a:stCxn id="252" idx="2"/>
-            <a:endCxn id="363" idx="1"/>
+            <a:stCxn id="130" idx="2"/>
+            <a:endCxn id="73" idx="1"/>
           </p:cNvCxnSpPr>
           <p:nvPr/>
         </p:nvCxnSpPr>
         <p:spPr>
           <a:xfrm rot="16200000" flipH="1">
-            <a:off x="9840894" y="2248051"/>
-            <a:ext cx="532275" cy="498717"/>
+            <a:off x="16399454" y="5738496"/>
+            <a:ext cx="726796" cy="892344"/>
           </a:xfrm>
           <a:prstGeom prst="bentConnector2">
             <a:avLst/>
@@ -4556,9 +3824,9 @@
           </a:solidFill>
           <a:ln w="31750">
             <a:solidFill>
-              <a:srgbClr val="666633">
+              <a:schemeClr val="tx1">
                 <a:alpha val="63000"/>
-              </a:srgbClr>
+              </a:schemeClr>
             </a:solidFill>
             <a:headEnd w="lg" len="lg"/>
             <a:tailEnd type="triangle"/>
@@ -4579,18 +3847,76 @@
           </a:fontRef>
         </p:style>
       </p:cxnSp>
+      <p:sp>
+        <p:nvSpPr>
+          <p:cNvPr id="85" name="Rounded Rectangle 84"/>
+          <p:cNvSpPr/>
+          <p:nvPr/>
+        </p:nvSpPr>
+        <p:spPr>
+          <a:xfrm>
+            <a:off x="17209027" y="8285580"/>
+            <a:ext cx="2420471" cy="806824"/>
+          </a:xfrm>
+          <a:prstGeom prst="roundRect">
+            <a:avLst/>
+          </a:prstGeom>
+          <a:noFill/>
+          <a:ln w="31750">
+            <a:solidFill>
+              <a:schemeClr val="tx1">
+                <a:alpha val="63000"/>
+              </a:schemeClr>
+            </a:solidFill>
+            <a:headEnd w="lg" len="lg"/>
+            <a:tailEnd type="triangle"/>
+          </a:ln>
+        </p:spPr>
+        <p:style>
+          <a:lnRef idx="1">
+            <a:schemeClr val="accent1"/>
+          </a:lnRef>
+          <a:fillRef idx="0">
+            <a:schemeClr val="accent1"/>
+          </a:fillRef>
+          <a:effectRef idx="0">
+            <a:schemeClr val="accent1"/>
+          </a:effectRef>
+          <a:fontRef idx="minor">
+            <a:schemeClr val="tx1"/>
+          </a:fontRef>
+        </p:style>
+        <p:txBody>
+          <a:bodyPr rtlCol="0" anchor="ctr"/>
+          <a:lstStyle/>
+          <a:p>
+            <a:pPr algn="ctr"/>
+            <a:r>
+              <a:rPr lang="en-US" sz="2000" dirty="0"/>
+              <a:t>Else Part</a:t>
+            </a:r>
+          </a:p>
+          <a:p>
+            <a:pPr algn="ctr"/>
+            <a:r>
+              <a:rPr lang="en-US" sz="2000" dirty="0"/>
+              <a:t>Statement</a:t>
+            </a:r>
+          </a:p>
+        </p:txBody>
+      </p:sp>
       <p:cxnSp>
         <p:nvCxnSpPr>
-          <p:cNvPr id="2167" name="Elbow Connector 2166"/>
+          <p:cNvPr id="86" name="Elbow Connector 85"/>
           <p:cNvCxnSpPr>
-            <a:endCxn id="366" idx="1"/>
+            <a:endCxn id="85" idx="1"/>
           </p:cNvCxnSpPr>
           <p:nvPr/>
         </p:nvCxnSpPr>
         <p:spPr>
           <a:xfrm rot="16200000" flipH="1">
-            <a:off x="11138626" y="4914839"/>
-            <a:ext cx="661980" cy="488273"/>
+            <a:off x="16217341" y="7697305"/>
+            <a:ext cx="1091031" cy="892342"/>
           </a:xfrm>
           <a:prstGeom prst="bentConnector2">
             <a:avLst/>
@@ -4603,9 +3929,9 @@
           </a:solidFill>
           <a:ln w="31750">
             <a:solidFill>
-              <a:srgbClr val="666633">
+              <a:schemeClr val="tx1">
                 <a:alpha val="63000"/>
-              </a:srgbClr>
+              </a:schemeClr>
             </a:solidFill>
             <a:headEnd w="lg" len="lg"/>
             <a:tailEnd type="triangle"/>
@@ -4628,29 +3954,24 @@
       </p:cxnSp>
       <p:sp>
         <p:nvSpPr>
-          <p:cNvPr id="252" name="Rounded Rectangle 251"/>
+          <p:cNvPr id="125" name="Rounded Rectangle 124"/>
           <p:cNvSpPr/>
           <p:nvPr/>
         </p:nvSpPr>
         <p:spPr>
           <a:xfrm>
-            <a:off x="9235484" y="1736695"/>
-            <a:ext cx="1244378" cy="494577"/>
+            <a:off x="10999716" y="457970"/>
+            <a:ext cx="2420471" cy="806824"/>
           </a:xfrm>
           <a:prstGeom prst="roundRect">
             <a:avLst/>
           </a:prstGeom>
-          <a:solidFill>
-            <a:schemeClr val="accent6">
-              <a:lumMod val="40000"/>
-              <a:lumOff val="60000"/>
-            </a:schemeClr>
-          </a:solidFill>
+          <a:noFill/>
           <a:ln w="31750">
             <a:solidFill>
-              <a:srgbClr val="666633">
+              <a:schemeClr val="tx1">
                 <a:alpha val="63000"/>
-              </a:srgbClr>
+              </a:schemeClr>
             </a:solidFill>
             <a:headEnd w="lg" len="lg"/>
             <a:tailEnd type="triangle"/>
@@ -4676,28 +3997,314 @@
           <a:p>
             <a:pPr algn="ctr"/>
             <a:r>
-              <a:rPr lang="en-US" sz="1312" dirty="0">
+              <a:rPr lang="en-US" sz="2000" dirty="0"/>
+              <a:t>Method Declaration</a:t>
+            </a:r>
+          </a:p>
+          <a:p>
+            <a:pPr algn="ctr"/>
+            <a:r>
+              <a:rPr lang="en-US" sz="2000" i="1" dirty="0" err="1"/>
+              <a:t>actionPerformed</a:t>
+            </a:r>
+            <a:endParaRPr lang="en-US" sz="2000" i="1" dirty="0"/>
+          </a:p>
+        </p:txBody>
+      </p:sp>
+      <p:sp>
+        <p:nvSpPr>
+          <p:cNvPr id="126" name="Rounded Rectangle 125"/>
+          <p:cNvSpPr/>
+          <p:nvPr/>
+        </p:nvSpPr>
+        <p:spPr>
+          <a:xfrm>
+            <a:off x="13036698" y="1641493"/>
+            <a:ext cx="2420471" cy="806824"/>
+          </a:xfrm>
+          <a:prstGeom prst="roundRect">
+            <a:avLst/>
+          </a:prstGeom>
+          <a:noFill/>
+          <a:ln w="31750">
+            <a:solidFill>
+              <a:schemeClr val="tx1">
+                <a:alpha val="63000"/>
+              </a:schemeClr>
+            </a:solidFill>
+            <a:headEnd w="lg" len="lg"/>
+            <a:tailEnd type="triangle"/>
+          </a:ln>
+        </p:spPr>
+        <p:style>
+          <a:lnRef idx="1">
+            <a:schemeClr val="accent1"/>
+          </a:lnRef>
+          <a:fillRef idx="0">
+            <a:schemeClr val="accent1"/>
+          </a:fillRef>
+          <a:effectRef idx="0">
+            <a:schemeClr val="accent1"/>
+          </a:effectRef>
+          <a:fontRef idx="minor">
+            <a:schemeClr val="tx1"/>
+          </a:fontRef>
+        </p:style>
+        <p:txBody>
+          <a:bodyPr rtlCol="0" anchor="ctr"/>
+          <a:lstStyle/>
+          <a:p>
+            <a:pPr algn="ctr"/>
+            <a:r>
+              <a:rPr lang="en-US" sz="2000" dirty="0"/>
+              <a:t>Parameter</a:t>
+            </a:r>
+          </a:p>
+        </p:txBody>
+      </p:sp>
+      <p:sp>
+        <p:nvSpPr>
+          <p:cNvPr id="127" name="Rounded Rectangle 126"/>
+          <p:cNvSpPr/>
+          <p:nvPr/>
+        </p:nvSpPr>
+        <p:spPr>
+          <a:xfrm>
+            <a:off x="13036697" y="2728229"/>
+            <a:ext cx="2420471" cy="806824"/>
+          </a:xfrm>
+          <a:prstGeom prst="roundRect">
+            <a:avLst/>
+          </a:prstGeom>
+          <a:noFill/>
+          <a:ln w="31750">
+            <a:solidFill>
+              <a:schemeClr val="tx1">
+                <a:alpha val="63000"/>
+              </a:schemeClr>
+            </a:solidFill>
+            <a:headEnd w="lg" len="lg"/>
+            <a:tailEnd type="triangle"/>
+          </a:ln>
+        </p:spPr>
+        <p:style>
+          <a:lnRef idx="1">
+            <a:schemeClr val="accent1"/>
+          </a:lnRef>
+          <a:fillRef idx="0">
+            <a:schemeClr val="accent1"/>
+          </a:fillRef>
+          <a:effectRef idx="0">
+            <a:schemeClr val="accent1"/>
+          </a:effectRef>
+          <a:fontRef idx="minor">
+            <a:schemeClr val="tx1"/>
+          </a:fontRef>
+        </p:style>
+        <p:txBody>
+          <a:bodyPr rtlCol="0" anchor="ctr"/>
+          <a:lstStyle/>
+          <a:p>
+            <a:pPr algn="ctr"/>
+            <a:r>
+              <a:rPr lang="en-US" sz="2000" dirty="0"/>
+              <a:t>Block</a:t>
+            </a:r>
+          </a:p>
+        </p:txBody>
+      </p:sp>
+      <p:sp>
+        <p:nvSpPr>
+          <p:cNvPr id="128" name="Rounded Rectangle 127"/>
+          <p:cNvSpPr/>
+          <p:nvPr/>
+        </p:nvSpPr>
+        <p:spPr>
+          <a:xfrm>
+            <a:off x="15106447" y="3917656"/>
+            <a:ext cx="2420471" cy="806824"/>
+          </a:xfrm>
+          <a:prstGeom prst="roundRect">
+            <a:avLst/>
+          </a:prstGeom>
+          <a:noFill/>
+          <a:ln w="31750">
+            <a:solidFill>
+              <a:schemeClr val="tx1">
+                <a:alpha val="63000"/>
+              </a:schemeClr>
+            </a:solidFill>
+            <a:headEnd w="lg" len="lg"/>
+            <a:tailEnd type="triangle"/>
+          </a:ln>
+        </p:spPr>
+        <p:style>
+          <a:lnRef idx="1">
+            <a:schemeClr val="accent1"/>
+          </a:lnRef>
+          <a:fillRef idx="0">
+            <a:schemeClr val="accent1"/>
+          </a:fillRef>
+          <a:effectRef idx="0">
+            <a:schemeClr val="accent1"/>
+          </a:effectRef>
+          <a:fontRef idx="minor">
+            <a:schemeClr val="tx1"/>
+          </a:fontRef>
+        </p:style>
+        <p:txBody>
+          <a:bodyPr rtlCol="0" anchor="ctr"/>
+          <a:lstStyle/>
+          <a:p>
+            <a:pPr algn="ctr"/>
+            <a:endParaRPr lang="en-US" sz="2000" dirty="0"/>
+          </a:p>
+          <a:p>
+            <a:pPr algn="ctr"/>
+            <a:r>
+              <a:rPr lang="en-US" sz="2000" dirty="0"/>
+              <a:t>Variable Declaration</a:t>
+            </a:r>
+          </a:p>
+          <a:p>
+            <a:pPr algn="ctr"/>
+            <a:r>
+              <a:rPr lang="en-US" sz="2000" dirty="0"/>
+              <a:t>Statement </a:t>
+            </a:r>
+          </a:p>
+          <a:p>
+            <a:pPr algn="ctr"/>
+            <a:endParaRPr lang="en-US" sz="2000" dirty="0"/>
+          </a:p>
+        </p:txBody>
+      </p:sp>
+      <p:sp>
+        <p:nvSpPr>
+          <p:cNvPr id="129" name="Rounded Rectangle 128"/>
+          <p:cNvSpPr/>
+          <p:nvPr/>
+        </p:nvSpPr>
+        <p:spPr>
+          <a:xfrm>
+            <a:off x="17209027" y="7215117"/>
+            <a:ext cx="2420471" cy="806824"/>
+          </a:xfrm>
+          <a:prstGeom prst="roundRect">
+            <a:avLst/>
+          </a:prstGeom>
+          <a:noFill/>
+          <a:ln w="31750">
+            <a:solidFill>
+              <a:schemeClr val="tx1">
+                <a:alpha val="63000"/>
+              </a:schemeClr>
+            </a:solidFill>
+            <a:headEnd w="lg" len="lg"/>
+            <a:tailEnd type="triangle"/>
+          </a:ln>
+        </p:spPr>
+        <p:style>
+          <a:lnRef idx="1">
+            <a:schemeClr val="accent1"/>
+          </a:lnRef>
+          <a:fillRef idx="0">
+            <a:schemeClr val="accent1"/>
+          </a:fillRef>
+          <a:effectRef idx="0">
+            <a:schemeClr val="accent1"/>
+          </a:effectRef>
+          <a:fontRef idx="minor">
+            <a:schemeClr val="tx1"/>
+          </a:fontRef>
+        </p:style>
+        <p:txBody>
+          <a:bodyPr rtlCol="0" anchor="ctr"/>
+          <a:lstStyle/>
+          <a:p>
+            <a:pPr algn="ctr"/>
+            <a:r>
+              <a:rPr lang="en-US" sz="2000" dirty="0"/>
+              <a:t>Then Part</a:t>
+            </a:r>
+          </a:p>
+          <a:p>
+            <a:pPr algn="ctr"/>
+            <a:r>
+              <a:rPr lang="en-US" sz="2000" dirty="0">
                 <a:solidFill>
-                  <a:srgbClr val="666633"/>
+                  <a:srgbClr val="C00000"/>
                 </a:solidFill>
               </a:rPr>
-              <a:t>Block</a:t>
+              <a:t>Log Statement</a:t>
+            </a:r>
+          </a:p>
+        </p:txBody>
+      </p:sp>
+      <p:sp>
+        <p:nvSpPr>
+          <p:cNvPr id="130" name="Rounded Rectangle 129"/>
+          <p:cNvSpPr/>
+          <p:nvPr/>
+        </p:nvSpPr>
+        <p:spPr>
+          <a:xfrm>
+            <a:off x="15106447" y="5014446"/>
+            <a:ext cx="2420471" cy="806824"/>
+          </a:xfrm>
+          <a:prstGeom prst="roundRect">
+            <a:avLst/>
+          </a:prstGeom>
+          <a:noFill/>
+          <a:ln w="31750">
+            <a:solidFill>
+              <a:schemeClr val="tx1">
+                <a:alpha val="63000"/>
+              </a:schemeClr>
+            </a:solidFill>
+            <a:headEnd w="lg" len="lg"/>
+            <a:tailEnd type="triangle"/>
+          </a:ln>
+        </p:spPr>
+        <p:style>
+          <a:lnRef idx="1">
+            <a:schemeClr val="accent1"/>
+          </a:lnRef>
+          <a:fillRef idx="0">
+            <a:schemeClr val="accent1"/>
+          </a:fillRef>
+          <a:effectRef idx="0">
+            <a:schemeClr val="accent1"/>
+          </a:effectRef>
+          <a:fontRef idx="minor">
+            <a:schemeClr val="tx1"/>
+          </a:fontRef>
+        </p:style>
+        <p:txBody>
+          <a:bodyPr rtlCol="0" anchor="ctr"/>
+          <a:lstStyle/>
+          <a:p>
+            <a:pPr algn="ctr"/>
+            <a:r>
+              <a:rPr lang="en-US" sz="2000" dirty="0"/>
+              <a:t>If Statement</a:t>
             </a:r>
           </a:p>
         </p:txBody>
       </p:sp>
       <p:cxnSp>
         <p:nvCxnSpPr>
-          <p:cNvPr id="239" name="Elbow Connector 238"/>
+          <p:cNvPr id="131" name="Elbow Connector 130"/>
           <p:cNvCxnSpPr>
-            <a:endCxn id="252" idx="1"/>
+            <a:stCxn id="125" idx="2"/>
+            <a:endCxn id="126" idx="1"/>
           </p:cNvCxnSpPr>
           <p:nvPr/>
         </p:nvCxnSpPr>
         <p:spPr>
           <a:xfrm rot="16200000" flipH="1">
-            <a:off x="8605921" y="1354420"/>
-            <a:ext cx="672462" cy="586665"/>
+            <a:off x="12233270" y="1241476"/>
+            <a:ext cx="780111" cy="826746"/>
           </a:xfrm>
           <a:prstGeom prst="bentConnector2">
             <a:avLst/>
@@ -4710,9 +4317,9 @@
           </a:solidFill>
           <a:ln w="31750">
             <a:solidFill>
-              <a:srgbClr val="666633">
+              <a:schemeClr val="tx1">
                 <a:alpha val="63000"/>
-              </a:srgbClr>
+              </a:schemeClr>
             </a:solidFill>
             <a:headEnd w="lg" len="lg"/>
             <a:tailEnd type="triangle"/>
@@ -4733,28 +4340,35 @@
           </a:fontRef>
         </p:style>
       </p:cxnSp>
-      <p:sp>
-        <p:nvSpPr>
-          <p:cNvPr id="32" name="Rectangle 31"/>
-          <p:cNvSpPr/>
+      <p:cxnSp>
+        <p:nvCxnSpPr>
+          <p:cNvPr id="132" name="Elbow Connector 131"/>
+          <p:cNvCxnSpPr>
+            <a:endCxn id="127" idx="1"/>
+          </p:cNvCxnSpPr>
           <p:nvPr/>
-        </p:nvSpPr>
-        <p:spPr>
-          <a:xfrm>
-            <a:off x="1035698" y="6217641"/>
-            <a:ext cx="4282751" cy="491068"/>
-          </a:xfrm>
-          <a:prstGeom prst="rect">
+        </p:nvCxnSpPr>
+        <p:spPr>
+          <a:xfrm rot="16200000" flipH="1">
+            <a:off x="12079959" y="2174901"/>
+            <a:ext cx="1086735" cy="826746"/>
+          </a:xfrm>
+          <a:prstGeom prst="bentConnector2">
             <a:avLst/>
           </a:prstGeom>
-          <a:ln w="28575">
+          <a:solidFill>
+            <a:schemeClr val="accent6">
+              <a:lumMod val="40000"/>
+              <a:lumOff val="60000"/>
+            </a:schemeClr>
+          </a:solidFill>
+          <a:ln w="31750">
             <a:solidFill>
-              <a:schemeClr val="bg2">
-                <a:lumMod val="75000"/>
+              <a:schemeClr val="tx1">
+                <a:alpha val="63000"/>
               </a:schemeClr>
             </a:solidFill>
-            <a:prstDash val="solid"/>
-            <a:headEnd type="triangle"/>
+            <a:headEnd w="lg" len="lg"/>
             <a:tailEnd type="triangle"/>
           </a:ln>
         </p:spPr>
@@ -4772,82 +4386,162 @@
             <a:schemeClr val="tx1"/>
           </a:fontRef>
         </p:style>
-        <p:txBody>
-          <a:bodyPr rtlCol="0" anchor="ctr"/>
-          <a:lstStyle/>
-          <a:p>
-            <a:pPr algn="ctr"/>
-            <a:r>
-              <a:rPr lang="en-US" sz="1310" dirty="0">
-                <a:solidFill>
-                  <a:srgbClr val="666633"/>
-                </a:solidFill>
-              </a:rPr>
-              <a:t>                </a:t>
-            </a:r>
-            <a:r>
-              <a:rPr lang="en-US" sz="1310" dirty="0">
-                <a:solidFill>
-                  <a:schemeClr val="bg2">
-                    <a:lumMod val="50000"/>
-                  </a:schemeClr>
-                </a:solidFill>
-              </a:rPr>
-              <a:t>Correspondence Connection (</a:t>
-            </a:r>
-            <a:r>
-              <a:rPr lang="en-US" sz="1310" dirty="0" err="1">
-                <a:solidFill>
-                  <a:schemeClr val="bg2">
-                    <a:lumMod val="50000"/>
-                  </a:schemeClr>
-                </a:solidFill>
-              </a:rPr>
-              <a:t>nodeA</a:t>
-            </a:r>
-            <a:r>
-              <a:rPr lang="en-US" sz="1310" dirty="0">
-                <a:solidFill>
-                  <a:schemeClr val="bg2">
-                    <a:lumMod val="50000"/>
-                  </a:schemeClr>
-                </a:solidFill>
-              </a:rPr>
-              <a:t>, </a:t>
-            </a:r>
-            <a:r>
-              <a:rPr lang="en-US" sz="1310" dirty="0" err="1">
-                <a:solidFill>
-                  <a:schemeClr val="bg2">
-                    <a:lumMod val="50000"/>
-                  </a:schemeClr>
-                </a:solidFill>
-              </a:rPr>
-              <a:t>nodeB</a:t>
-            </a:r>
-            <a:r>
-              <a:rPr lang="en-US" sz="1310" dirty="0">
-                <a:solidFill>
-                  <a:schemeClr val="bg2">
-                    <a:lumMod val="50000"/>
-                  </a:schemeClr>
-                </a:solidFill>
-              </a:rPr>
-              <a:t>)</a:t>
-            </a:r>
-          </a:p>
-        </p:txBody>
-      </p:sp>
+      </p:cxnSp>
       <p:cxnSp>
         <p:nvCxnSpPr>
-          <p:cNvPr id="33" name="Straight Arrow Connector 32"/>
-          <p:cNvCxnSpPr/>
+          <p:cNvPr id="133" name="Elbow Connector 132"/>
+          <p:cNvCxnSpPr>
+            <a:stCxn id="127" idx="2"/>
+            <a:endCxn id="128" idx="1"/>
+          </p:cNvCxnSpPr>
           <p:nvPr/>
         </p:nvCxnSpPr>
         <p:spPr>
+          <a:xfrm rot="16200000" flipH="1">
+            <a:off x="14283683" y="3498303"/>
+            <a:ext cx="786015" cy="859514"/>
+          </a:xfrm>
+          <a:prstGeom prst="bentConnector2">
+            <a:avLst/>
+          </a:prstGeom>
+          <a:solidFill>
+            <a:schemeClr val="accent6">
+              <a:lumMod val="40000"/>
+              <a:lumOff val="60000"/>
+            </a:schemeClr>
+          </a:solidFill>
+          <a:ln w="31750">
+            <a:solidFill>
+              <a:schemeClr val="tx1">
+                <a:alpha val="63000"/>
+              </a:schemeClr>
+            </a:solidFill>
+            <a:headEnd w="lg" len="lg"/>
+            <a:tailEnd type="triangle"/>
+          </a:ln>
+        </p:spPr>
+        <p:style>
+          <a:lnRef idx="1">
+            <a:schemeClr val="accent1"/>
+          </a:lnRef>
+          <a:fillRef idx="0">
+            <a:schemeClr val="accent1"/>
+          </a:fillRef>
+          <a:effectRef idx="0">
+            <a:schemeClr val="accent1"/>
+          </a:effectRef>
+          <a:fontRef idx="minor">
+            <a:schemeClr val="tx1"/>
+          </a:fontRef>
+        </p:style>
+      </p:cxnSp>
+      <p:cxnSp>
+        <p:nvCxnSpPr>
+          <p:cNvPr id="134" name="Elbow Connector 133"/>
+          <p:cNvCxnSpPr>
+            <a:endCxn id="129" idx="1"/>
+          </p:cNvCxnSpPr>
+          <p:nvPr/>
+        </p:nvCxnSpPr>
+        <p:spPr>
+          <a:xfrm rot="16200000" flipH="1">
+            <a:off x="16214499" y="6624003"/>
+            <a:ext cx="1096713" cy="892343"/>
+          </a:xfrm>
+          <a:prstGeom prst="bentConnector2">
+            <a:avLst/>
+          </a:prstGeom>
+          <a:solidFill>
+            <a:schemeClr val="accent6">
+              <a:lumMod val="40000"/>
+              <a:lumOff val="60000"/>
+            </a:schemeClr>
+          </a:solidFill>
+          <a:ln w="31750">
+            <a:solidFill>
+              <a:schemeClr val="tx1">
+                <a:alpha val="63000"/>
+              </a:schemeClr>
+            </a:solidFill>
+            <a:headEnd w="lg" len="lg"/>
+            <a:tailEnd type="triangle"/>
+          </a:ln>
+        </p:spPr>
+        <p:style>
+          <a:lnRef idx="1">
+            <a:schemeClr val="accent1"/>
+          </a:lnRef>
+          <a:fillRef idx="0">
+            <a:schemeClr val="accent1"/>
+          </a:fillRef>
+          <a:effectRef idx="0">
+            <a:schemeClr val="accent1"/>
+          </a:effectRef>
+          <a:fontRef idx="minor">
+            <a:schemeClr val="tx1"/>
+          </a:fontRef>
+        </p:style>
+      </p:cxnSp>
+      <p:cxnSp>
+        <p:nvCxnSpPr>
+          <p:cNvPr id="139" name="Elbow Connector 138"/>
+          <p:cNvCxnSpPr>
+            <a:endCxn id="130" idx="1"/>
+          </p:cNvCxnSpPr>
+          <p:nvPr/>
+        </p:nvCxnSpPr>
+        <p:spPr>
+          <a:xfrm rot="16200000" flipH="1">
+            <a:off x="14128293" y="4439710"/>
+            <a:ext cx="1096788" cy="859513"/>
+          </a:xfrm>
+          <a:prstGeom prst="bentConnector2">
+            <a:avLst/>
+          </a:prstGeom>
+          <a:solidFill>
+            <a:schemeClr val="accent6">
+              <a:lumMod val="40000"/>
+              <a:lumOff val="60000"/>
+            </a:schemeClr>
+          </a:solidFill>
+          <a:ln w="31750">
+            <a:solidFill>
+              <a:schemeClr val="tx1">
+                <a:alpha val="63000"/>
+              </a:schemeClr>
+            </a:solidFill>
+            <a:headEnd w="lg" len="lg"/>
+            <a:tailEnd type="triangle"/>
+          </a:ln>
+        </p:spPr>
+        <p:style>
+          <a:lnRef idx="1">
+            <a:schemeClr val="accent1"/>
+          </a:lnRef>
+          <a:fillRef idx="0">
+            <a:schemeClr val="accent1"/>
+          </a:fillRef>
+          <a:effectRef idx="0">
+            <a:schemeClr val="accent1"/>
+          </a:effectRef>
+          <a:fontRef idx="minor">
+            <a:schemeClr val="tx1"/>
+          </a:fontRef>
+        </p:style>
+      </p:cxnSp>
+      <p:cxnSp>
+        <p:nvCxnSpPr>
+          <p:cNvPr id="3" name="Straight Arrow Connector 2"/>
+          <p:cNvCxnSpPr>
+            <a:stCxn id="51" idx="3"/>
+            <a:endCxn id="125" idx="1"/>
+          </p:cNvCxnSpPr>
+          <p:nvPr/>
+        </p:nvCxnSpPr>
+        <p:spPr>
           <a:xfrm>
-            <a:off x="1223567" y="6454074"/>
-            <a:ext cx="712404" cy="2"/>
+            <a:off x="2948135" y="861382"/>
+            <a:ext cx="8051581" cy="0"/>
           </a:xfrm>
           <a:prstGeom prst="straightConnector1">
             <a:avLst/>
@@ -4858,7 +4552,7 @@
                 <a:lumMod val="75000"/>
               </a:schemeClr>
             </a:solidFill>
-            <a:prstDash val="dash"/>
+            <a:prstDash val="lgDash"/>
             <a:headEnd type="triangle"/>
             <a:tailEnd type="triangle"/>
           </a:ln>
@@ -4880,17 +4574,17 @@
       </p:cxnSp>
       <p:cxnSp>
         <p:nvCxnSpPr>
-          <p:cNvPr id="41" name="Straight Arrow Connector 40"/>
+          <p:cNvPr id="34" name="Straight Arrow Connector 33"/>
           <p:cNvCxnSpPr>
-            <a:stCxn id="51" idx="3"/>
-            <a:endCxn id="361" idx="1"/>
+            <a:stCxn id="52" idx="3"/>
+            <a:endCxn id="126" idx="1"/>
           </p:cNvCxnSpPr>
           <p:nvPr/>
         </p:nvCxnSpPr>
         <p:spPr>
           <a:xfrm>
-            <a:off x="2208545" y="626673"/>
-            <a:ext cx="5581880" cy="0"/>
+            <a:off x="4985117" y="1957819"/>
+            <a:ext cx="8051581" cy="87086"/>
           </a:xfrm>
           <a:prstGeom prst="straightConnector1">
             <a:avLst/>
@@ -4901,7 +4595,7 @@
                 <a:lumMod val="75000"/>
               </a:schemeClr>
             </a:solidFill>
-            <a:prstDash val="dash"/>
+            <a:prstDash val="lgDash"/>
             <a:headEnd type="triangle"/>
             <a:tailEnd type="triangle"/>
           </a:ln>
@@ -4923,17 +4617,14 @@
       </p:cxnSp>
       <p:cxnSp>
         <p:nvCxnSpPr>
-          <p:cNvPr id="45" name="Straight Arrow Connector 44"/>
-          <p:cNvCxnSpPr>
-            <a:stCxn id="53" idx="3"/>
-            <a:endCxn id="252" idx="1"/>
-          </p:cNvCxnSpPr>
+          <p:cNvPr id="37" name="Straight Arrow Connector 36"/>
+          <p:cNvCxnSpPr/>
           <p:nvPr/>
         </p:nvCxnSpPr>
         <p:spPr>
-          <a:xfrm flipV="1">
-            <a:off x="3241917" y="1983984"/>
-            <a:ext cx="5993567" cy="77435"/>
+          <a:xfrm>
+            <a:off x="4985116" y="3010025"/>
+            <a:ext cx="8051581" cy="87086"/>
           </a:xfrm>
           <a:prstGeom prst="straightConnector1">
             <a:avLst/>
@@ -4944,7 +4635,7 @@
                 <a:lumMod val="75000"/>
               </a:schemeClr>
             </a:solidFill>
-            <a:prstDash val="dash"/>
+            <a:prstDash val="lgDash"/>
             <a:headEnd type="triangle"/>
             <a:tailEnd type="triangle"/>
           </a:ln>
@@ -4966,17 +4657,17 @@
       </p:cxnSp>
       <p:cxnSp>
         <p:nvCxnSpPr>
-          <p:cNvPr id="54" name="Straight Arrow Connector 53"/>
+          <p:cNvPr id="44" name="Straight Arrow Connector 43"/>
           <p:cNvCxnSpPr>
             <a:stCxn id="69" idx="3"/>
-            <a:endCxn id="365" idx="1"/>
+            <a:endCxn id="129" idx="1"/>
           </p:cNvCxnSpPr>
           <p:nvPr/>
         </p:nvCxnSpPr>
         <p:spPr>
           <a:xfrm flipV="1">
-            <a:off x="5094609" y="4827988"/>
-            <a:ext cx="6619143" cy="512794"/>
+            <a:off x="7029988" y="7618529"/>
+            <a:ext cx="10179036" cy="963974"/>
           </a:xfrm>
           <a:prstGeom prst="straightConnector1">
             <a:avLst/>
@@ -4987,7 +4678,7 @@
                 <a:lumMod val="75000"/>
               </a:schemeClr>
             </a:solidFill>
-            <a:prstDash val="dash"/>
+            <a:prstDash val="lgDash"/>
             <a:headEnd type="triangle"/>
             <a:tailEnd type="triangle"/>
           </a:ln>
@@ -5007,19 +4698,89 @@
           </a:fontRef>
         </p:style>
       </p:cxnSp>
+      <p:sp>
+        <p:nvSpPr>
+          <p:cNvPr id="48" name="Rounded Rectangle 47"/>
+          <p:cNvSpPr/>
+          <p:nvPr/>
+        </p:nvSpPr>
+        <p:spPr>
+          <a:xfrm>
+            <a:off x="1737895" y="9652966"/>
+            <a:ext cx="6822282" cy="806824"/>
+          </a:xfrm>
+          <a:prstGeom prst="roundRect">
+            <a:avLst/>
+          </a:prstGeom>
+          <a:noFill/>
+          <a:ln w="31750">
+            <a:solidFill>
+              <a:schemeClr val="tx1">
+                <a:lumMod val="65000"/>
+                <a:lumOff val="35000"/>
+                <a:alpha val="63000"/>
+              </a:schemeClr>
+            </a:solidFill>
+            <a:headEnd w="lg" len="lg"/>
+            <a:tailEnd type="triangle"/>
+          </a:ln>
+        </p:spPr>
+        <p:style>
+          <a:lnRef idx="1">
+            <a:schemeClr val="accent1"/>
+          </a:lnRef>
+          <a:fillRef idx="0">
+            <a:schemeClr val="accent1"/>
+          </a:fillRef>
+          <a:effectRef idx="0">
+            <a:schemeClr val="accent1"/>
+          </a:effectRef>
+          <a:fontRef idx="minor">
+            <a:schemeClr val="tx1"/>
+          </a:fontRef>
+        </p:style>
+        <p:txBody>
+          <a:bodyPr rtlCol="0" anchor="ctr"/>
+          <a:lstStyle/>
+          <a:p>
+            <a:pPr algn="ctr"/>
+            <a:endParaRPr lang="en-US" sz="2000" dirty="0"/>
+          </a:p>
+          <a:p>
+            <a:pPr algn="ctr"/>
+            <a:r>
+              <a:rPr lang="en-US" sz="2000" dirty="0"/>
+              <a:t>                </a:t>
+            </a:r>
+            <a:r>
+              <a:rPr lang="en-US" sz="2200" dirty="0"/>
+              <a:t>Correspondence Connection (</a:t>
+            </a:r>
+            <a:r>
+              <a:rPr lang="en-US" sz="2200" dirty="0" err="1"/>
+              <a:t>nodeA,nodeB</a:t>
+            </a:r>
+            <a:r>
+              <a:rPr lang="en-US" sz="2200" dirty="0"/>
+              <a:t>) </a:t>
+            </a:r>
+          </a:p>
+          <a:p>
+            <a:pPr algn="ctr"/>
+            <a:endParaRPr lang="en-US" sz="2000" dirty="0"/>
+          </a:p>
+        </p:txBody>
+      </p:sp>
       <p:cxnSp>
         <p:nvCxnSpPr>
-          <p:cNvPr id="42" name="Straight Arrow Connector 41"/>
-          <p:cNvCxnSpPr>
-            <a:stCxn id="52" idx="3"/>
-            <a:endCxn id="362" idx="1"/>
-          </p:cNvCxnSpPr>
+          <p:cNvPr id="49" name="Straight Arrow Connector 48"/>
+          <p:cNvCxnSpPr/>
           <p:nvPr/>
         </p:nvCxnSpPr>
         <p:spPr>
-          <a:xfrm flipV="1">
-            <a:off x="3241918" y="1299130"/>
-            <a:ext cx="5993566" cy="105349"/>
+          <a:xfrm>
+            <a:off x="1917429" y="10077594"/>
+            <a:ext cx="1047041" cy="0"/>
           </a:xfrm>
           <a:prstGeom prst="straightConnector1">
             <a:avLst/>
@@ -5030,7 +4791,7 @@
                 <a:lumMod val="75000"/>
               </a:schemeClr>
             </a:solidFill>
-            <a:prstDash val="dash"/>
+            <a:prstDash val="lgDash"/>
             <a:headEnd type="triangle"/>
             <a:tailEnd type="triangle"/>
           </a:ln>
@@ -5109,9 +4870,9 @@
         <a:latin typeface="Calibri Light" panose="020F0302020204030204"/>
         <a:ea typeface=""/>
         <a:cs typeface=""/>
-        <a:font script="Jpan" typeface="游ゴシック Light"/>
+        <a:font script="Jpan" typeface="ＭＳ Ｐゴシック"/>
         <a:font script="Hang" typeface="맑은 고딕"/>
-        <a:font script="Hans" typeface="等线 Light"/>
+        <a:font script="Hans" typeface="宋体"/>
         <a:font script="Hant" typeface="新細明體"/>
         <a:font script="Arab" typeface="Times New Roman"/>
         <a:font script="Hebr" typeface="Times New Roman"/>
@@ -5144,9 +4905,9 @@
         <a:latin typeface="Calibri" panose="020F0502020204030204"/>
         <a:ea typeface=""/>
         <a:cs typeface=""/>
-        <a:font script="Jpan" typeface="游ゴシック"/>
+        <a:font script="Jpan" typeface="ＭＳ Ｐゴシック"/>
         <a:font script="Hang" typeface="맑은 고딕"/>
-        <a:font script="Hans" typeface="等线"/>
+        <a:font script="Hans" typeface="宋体"/>
         <a:font script="Hant" typeface="新細明體"/>
         <a:font script="Arab" typeface="Arial"/>
         <a:font script="Hebr" typeface="Arial"/>

</xml_diff>